<commit_message>
Added the new version of the slides
</commit_message>
<xml_diff>
--- a/presentation/slides.pptx
+++ b/presentation/slides.pptx
@@ -11,8 +11,21 @@
     <p:sldId id="259" r:id="rId5"/>
     <p:sldId id="260" r:id="rId6"/>
     <p:sldId id="261" r:id="rId7"/>
-    <p:sldId id="262" r:id="rId8"/>
-    <p:sldId id="263" r:id="rId9"/>
+    <p:sldId id="265" r:id="rId8"/>
+    <p:sldId id="262" r:id="rId9"/>
+    <p:sldId id="263" r:id="rId10"/>
+    <p:sldId id="272" r:id="rId11"/>
+    <p:sldId id="264" r:id="rId12"/>
+    <p:sldId id="269" r:id="rId13"/>
+    <p:sldId id="271" r:id="rId14"/>
+    <p:sldId id="266" r:id="rId15"/>
+    <p:sldId id="273" r:id="rId16"/>
+    <p:sldId id="267" r:id="rId17"/>
+    <p:sldId id="274" r:id="rId18"/>
+    <p:sldId id="268" r:id="rId19"/>
+    <p:sldId id="275" r:id="rId20"/>
+    <p:sldId id="276" r:id="rId21"/>
+    <p:sldId id="277" r:id="rId22"/>
   </p:sldIdLst>
   <p:sldSz cx="9144000" cy="6858000" type="screen4x3"/>
   <p:notesSz cx="6858000" cy="9144000"/>
@@ -295,7 +308,7 @@
           <a:p>
             <a:fld id="{439BD6C3-830F-9543-8A1D-F37F17474F11}" type="datetimeFigureOut">
               <a:rPr lang="en-US" smtClean="0"/>
-              <a:t>2/20/15</a:t>
+              <a:t>3/8/15</a:t>
             </a:fld>
             <a:endParaRPr lang="en-US"/>
           </a:p>
@@ -465,7 +478,7 @@
           <a:p>
             <a:fld id="{439BD6C3-830F-9543-8A1D-F37F17474F11}" type="datetimeFigureOut">
               <a:rPr lang="en-US" smtClean="0"/>
-              <a:t>2/20/15</a:t>
+              <a:t>3/8/15</a:t>
             </a:fld>
             <a:endParaRPr lang="en-US"/>
           </a:p>
@@ -645,7 +658,7 @@
           <a:p>
             <a:fld id="{439BD6C3-830F-9543-8A1D-F37F17474F11}" type="datetimeFigureOut">
               <a:rPr lang="en-US" smtClean="0"/>
-              <a:t>2/20/15</a:t>
+              <a:t>3/8/15</a:t>
             </a:fld>
             <a:endParaRPr lang="en-US"/>
           </a:p>
@@ -815,7 +828,7 @@
           <a:p>
             <a:fld id="{439BD6C3-830F-9543-8A1D-F37F17474F11}" type="datetimeFigureOut">
               <a:rPr lang="en-US" smtClean="0"/>
-              <a:t>2/20/15</a:t>
+              <a:t>3/8/15</a:t>
             </a:fld>
             <a:endParaRPr lang="en-US"/>
           </a:p>
@@ -1061,7 +1074,7 @@
           <a:p>
             <a:fld id="{439BD6C3-830F-9543-8A1D-F37F17474F11}" type="datetimeFigureOut">
               <a:rPr lang="en-US" smtClean="0"/>
-              <a:t>2/20/15</a:t>
+              <a:t>3/8/15</a:t>
             </a:fld>
             <a:endParaRPr lang="en-US"/>
           </a:p>
@@ -1349,7 +1362,7 @@
           <a:p>
             <a:fld id="{439BD6C3-830F-9543-8A1D-F37F17474F11}" type="datetimeFigureOut">
               <a:rPr lang="en-US" smtClean="0"/>
-              <a:t>2/20/15</a:t>
+              <a:t>3/8/15</a:t>
             </a:fld>
             <a:endParaRPr lang="en-US"/>
           </a:p>
@@ -1771,7 +1784,7 @@
           <a:p>
             <a:fld id="{439BD6C3-830F-9543-8A1D-F37F17474F11}" type="datetimeFigureOut">
               <a:rPr lang="en-US" smtClean="0"/>
-              <a:t>2/20/15</a:t>
+              <a:t>3/8/15</a:t>
             </a:fld>
             <a:endParaRPr lang="en-US"/>
           </a:p>
@@ -1889,7 +1902,7 @@
           <a:p>
             <a:fld id="{439BD6C3-830F-9543-8A1D-F37F17474F11}" type="datetimeFigureOut">
               <a:rPr lang="en-US" smtClean="0"/>
-              <a:t>2/20/15</a:t>
+              <a:t>3/8/15</a:t>
             </a:fld>
             <a:endParaRPr lang="en-US"/>
           </a:p>
@@ -1984,7 +1997,7 @@
           <a:p>
             <a:fld id="{439BD6C3-830F-9543-8A1D-F37F17474F11}" type="datetimeFigureOut">
               <a:rPr lang="en-US" smtClean="0"/>
-              <a:t>2/20/15</a:t>
+              <a:t>3/8/15</a:t>
             </a:fld>
             <a:endParaRPr lang="en-US"/>
           </a:p>
@@ -2261,7 +2274,7 @@
           <a:p>
             <a:fld id="{439BD6C3-830F-9543-8A1D-F37F17474F11}" type="datetimeFigureOut">
               <a:rPr lang="en-US" smtClean="0"/>
-              <a:t>2/20/15</a:t>
+              <a:t>3/8/15</a:t>
             </a:fld>
             <a:endParaRPr lang="en-US"/>
           </a:p>
@@ -2514,7 +2527,7 @@
           <a:p>
             <a:fld id="{439BD6C3-830F-9543-8A1D-F37F17474F11}" type="datetimeFigureOut">
               <a:rPr lang="en-US" smtClean="0"/>
-              <a:t>2/20/15</a:t>
+              <a:t>3/8/15</a:t>
             </a:fld>
             <a:endParaRPr lang="en-US"/>
           </a:p>
@@ -2727,7 +2740,7 @@
           <a:p>
             <a:fld id="{439BD6C3-830F-9543-8A1D-F37F17474F11}" type="datetimeFigureOut">
               <a:rPr lang="en-US" smtClean="0"/>
-              <a:t>2/20/15</a:t>
+              <a:t>3/8/15</a:t>
             </a:fld>
             <a:endParaRPr lang="en-US"/>
           </a:p>
@@ -3119,7 +3132,15 @@
           <a:p>
             <a:r>
               <a:rPr lang="en-US" dirty="0" smtClean="0"/>
-              <a:t>Coexistence of Heterogeneous Traffic in CDMA/CA Networks</a:t>
+              <a:t>Coexistence of Heterogeneous Traffic in </a:t>
+            </a:r>
+            <a:r>
+              <a:rPr lang="en-US" dirty="0" smtClean="0"/>
+              <a:t>CSMA</a:t>
+            </a:r>
+            <a:r>
+              <a:rPr lang="en-US" dirty="0" smtClean="0"/>
+              <a:t>/CA Networks</a:t>
             </a:r>
             <a:endParaRPr lang="en-US" dirty="0"/>
           </a:p>
@@ -3162,6 +3183,1248 @@
     <p:extLst>
       <p:ext uri="{BB962C8B-B14F-4D97-AF65-F5344CB8AC3E}">
         <p14:creationId xmlns:p14="http://schemas.microsoft.com/office/powerpoint/2010/main" val="508809771"/>
+      </p:ext>
+    </p:extLst>
+  </p:cSld>
+  <p:clrMapOvr>
+    <a:masterClrMapping/>
+  </p:clrMapOvr>
+</p:sld>
+</file>
+
+<file path=ppt/slides/slide10.xml><?xml version="1.0" encoding="utf-8"?>
+<p:sld xmlns:a="http://schemas.openxmlformats.org/drawingml/2006/main" xmlns:r="http://schemas.openxmlformats.org/officeDocument/2006/relationships" xmlns:p="http://schemas.openxmlformats.org/presentationml/2006/main">
+  <p:cSld>
+    <p:spTree>
+      <p:nvGrpSpPr>
+        <p:cNvPr id="1" name=""/>
+        <p:cNvGrpSpPr/>
+        <p:nvPr/>
+      </p:nvGrpSpPr>
+      <p:grpSpPr>
+        <a:xfrm>
+          <a:off x="0" y="0"/>
+          <a:ext cx="0" cy="0"/>
+          <a:chOff x="0" y="0"/>
+          <a:chExt cx="0" cy="0"/>
+        </a:xfrm>
+      </p:grpSpPr>
+      <p:sp>
+        <p:nvSpPr>
+          <p:cNvPr id="2" name="Title 1"/>
+          <p:cNvSpPr>
+            <a:spLocks noGrp="1"/>
+          </p:cNvSpPr>
+          <p:nvPr>
+            <p:ph type="title"/>
+          </p:nvPr>
+        </p:nvSpPr>
+        <p:spPr/>
+        <p:txBody>
+          <a:bodyPr/>
+          <a:lstStyle/>
+          <a:p>
+            <a:r>
+              <a:rPr lang="en-US" dirty="0" smtClean="0"/>
+              <a:t>Size Chain </a:t>
+            </a:r>
+            <a:r>
+              <a:rPr lang="en-US" dirty="0" err="1" smtClean="0"/>
+              <a:t>Blackbox</a:t>
+            </a:r>
+            <a:endParaRPr lang="en-US" dirty="0"/>
+          </a:p>
+        </p:txBody>
+      </p:sp>
+      <p:pic>
+        <p:nvPicPr>
+          <p:cNvPr id="4" name="Picture 3" descr="size_chain_old.png"/>
+          <p:cNvPicPr>
+            <a:picLocks noChangeAspect="1"/>
+          </p:cNvPicPr>
+          <p:nvPr/>
+        </p:nvPicPr>
+        <p:blipFill>
+          <a:blip r:embed="rId2">
+            <a:extLst>
+              <a:ext uri="{28A0092B-C50C-407E-A947-70E740481C1C}">
+                <a14:useLocalDpi xmlns:a14="http://schemas.microsoft.com/office/drawing/2010/main" val="0"/>
+              </a:ext>
+            </a:extLst>
+          </a:blip>
+          <a:stretch>
+            <a:fillRect/>
+          </a:stretch>
+        </p:blipFill>
+        <p:spPr>
+          <a:xfrm>
+            <a:off x="1474901" y="1205957"/>
+            <a:ext cx="4099536" cy="5058707"/>
+          </a:xfrm>
+          <a:prstGeom prst="rect">
+            <a:avLst/>
+          </a:prstGeom>
+        </p:spPr>
+      </p:pic>
+      <p:sp>
+        <p:nvSpPr>
+          <p:cNvPr id="5" name="TextBox 4"/>
+          <p:cNvSpPr txBox="1"/>
+          <p:nvPr/>
+        </p:nvSpPr>
+        <p:spPr>
+          <a:xfrm>
+            <a:off x="5709138" y="1417638"/>
+            <a:ext cx="2828710" cy="646331"/>
+          </a:xfrm>
+          <a:prstGeom prst="rect">
+            <a:avLst/>
+          </a:prstGeom>
+          <a:noFill/>
+        </p:spPr>
+        <p:txBody>
+          <a:bodyPr wrap="square" rtlCol="0">
+            <a:spAutoFit/>
+          </a:bodyPr>
+          <a:lstStyle/>
+          <a:p>
+            <a:r>
+              <a:rPr lang="en-US" dirty="0" smtClean="0"/>
+              <a:t>Equal probability of entering each chain</a:t>
+            </a:r>
+            <a:endParaRPr lang="en-US" dirty="0"/>
+          </a:p>
+        </p:txBody>
+      </p:sp>
+      <p:sp>
+        <p:nvSpPr>
+          <p:cNvPr id="6" name="TextBox 5"/>
+          <p:cNvSpPr txBox="1"/>
+          <p:nvPr/>
+        </p:nvSpPr>
+        <p:spPr>
+          <a:xfrm>
+            <a:off x="5574437" y="4812613"/>
+            <a:ext cx="3335040" cy="646331"/>
+          </a:xfrm>
+          <a:prstGeom prst="rect">
+            <a:avLst/>
+          </a:prstGeom>
+          <a:noFill/>
+        </p:spPr>
+        <p:txBody>
+          <a:bodyPr wrap="square" rtlCol="0">
+            <a:spAutoFit/>
+          </a:bodyPr>
+          <a:lstStyle/>
+          <a:p>
+            <a:r>
+              <a:rPr lang="en-US" dirty="0" smtClean="0"/>
+              <a:t>Exit transition probability is a function of the chain length</a:t>
+            </a:r>
+            <a:endParaRPr lang="en-US" dirty="0"/>
+          </a:p>
+        </p:txBody>
+      </p:sp>
+      <p:cxnSp>
+        <p:nvCxnSpPr>
+          <p:cNvPr id="8" name="Straight Arrow Connector 7"/>
+          <p:cNvCxnSpPr>
+            <a:stCxn id="5" idx="1"/>
+          </p:cNvCxnSpPr>
+          <p:nvPr/>
+        </p:nvCxnSpPr>
+        <p:spPr>
+          <a:xfrm flipH="1" flipV="1">
+            <a:off x="3665778" y="1510636"/>
+            <a:ext cx="2043360" cy="230168"/>
+          </a:xfrm>
+          <a:prstGeom prst="straightConnector1">
+            <a:avLst/>
+          </a:prstGeom>
+          <a:ln>
+            <a:tailEnd type="arrow"/>
+          </a:ln>
+        </p:spPr>
+        <p:style>
+          <a:lnRef idx="2">
+            <a:schemeClr val="accent1"/>
+          </a:lnRef>
+          <a:fillRef idx="0">
+            <a:schemeClr val="accent1"/>
+          </a:fillRef>
+          <a:effectRef idx="1">
+            <a:schemeClr val="accent1"/>
+          </a:effectRef>
+          <a:fontRef idx="minor">
+            <a:schemeClr val="tx1"/>
+          </a:fontRef>
+        </p:style>
+      </p:cxnSp>
+      <p:cxnSp>
+        <p:nvCxnSpPr>
+          <p:cNvPr id="10" name="Straight Arrow Connector 9"/>
+          <p:cNvCxnSpPr>
+            <a:stCxn id="6" idx="1"/>
+          </p:cNvCxnSpPr>
+          <p:nvPr/>
+        </p:nvCxnSpPr>
+        <p:spPr>
+          <a:xfrm flipH="1">
+            <a:off x="3665779" y="5135779"/>
+            <a:ext cx="1908658" cy="502647"/>
+          </a:xfrm>
+          <a:prstGeom prst="straightConnector1">
+            <a:avLst/>
+          </a:prstGeom>
+          <a:ln>
+            <a:tailEnd type="arrow"/>
+          </a:ln>
+        </p:spPr>
+        <p:style>
+          <a:lnRef idx="2">
+            <a:schemeClr val="accent1"/>
+          </a:lnRef>
+          <a:fillRef idx="0">
+            <a:schemeClr val="accent1"/>
+          </a:fillRef>
+          <a:effectRef idx="1">
+            <a:schemeClr val="accent1"/>
+          </a:effectRef>
+          <a:fontRef idx="minor">
+            <a:schemeClr val="tx1"/>
+          </a:fontRef>
+        </p:style>
+      </p:cxnSp>
+      <p:sp>
+        <p:nvSpPr>
+          <p:cNvPr id="13" name="TextBox 12"/>
+          <p:cNvSpPr txBox="1"/>
+          <p:nvPr/>
+        </p:nvSpPr>
+        <p:spPr>
+          <a:xfrm>
+            <a:off x="6184200" y="3429000"/>
+            <a:ext cx="2295922" cy="923330"/>
+          </a:xfrm>
+          <a:prstGeom prst="rect">
+            <a:avLst/>
+          </a:prstGeom>
+          <a:noFill/>
+        </p:spPr>
+        <p:txBody>
+          <a:bodyPr wrap="square" rtlCol="0">
+            <a:spAutoFit/>
+          </a:bodyPr>
+          <a:lstStyle/>
+          <a:p>
+            <a:r>
+              <a:rPr lang="en-US" dirty="0" smtClean="0"/>
+              <a:t>P(success)  = </a:t>
+            </a:r>
+            <a:r>
+              <a:rPr lang="en-US" dirty="0"/>
+              <a:t>(1 – p)^n </a:t>
+            </a:r>
+          </a:p>
+          <a:p>
+            <a:endParaRPr lang="en-US" dirty="0" smtClean="0"/>
+          </a:p>
+          <a:p>
+            <a:endParaRPr lang="en-US" dirty="0"/>
+          </a:p>
+        </p:txBody>
+      </p:sp>
+      <p:cxnSp>
+        <p:nvCxnSpPr>
+          <p:cNvPr id="15" name="Straight Connector 14"/>
+          <p:cNvCxnSpPr/>
+          <p:nvPr/>
+        </p:nvCxnSpPr>
+        <p:spPr>
+          <a:xfrm>
+            <a:off x="5301428" y="2549801"/>
+            <a:ext cx="398089" cy="0"/>
+          </a:xfrm>
+          <a:prstGeom prst="line">
+            <a:avLst/>
+          </a:prstGeom>
+        </p:spPr>
+        <p:style>
+          <a:lnRef idx="2">
+            <a:schemeClr val="accent1"/>
+          </a:lnRef>
+          <a:fillRef idx="0">
+            <a:schemeClr val="accent1"/>
+          </a:fillRef>
+          <a:effectRef idx="1">
+            <a:schemeClr val="accent1"/>
+          </a:effectRef>
+          <a:fontRef idx="minor">
+            <a:schemeClr val="tx1"/>
+          </a:fontRef>
+        </p:style>
+      </p:cxnSp>
+      <p:cxnSp>
+        <p:nvCxnSpPr>
+          <p:cNvPr id="16" name="Straight Connector 15"/>
+          <p:cNvCxnSpPr/>
+          <p:nvPr/>
+        </p:nvCxnSpPr>
+        <p:spPr>
+          <a:xfrm>
+            <a:off x="5301428" y="4769358"/>
+            <a:ext cx="398089" cy="0"/>
+          </a:xfrm>
+          <a:prstGeom prst="line">
+            <a:avLst/>
+          </a:prstGeom>
+        </p:spPr>
+        <p:style>
+          <a:lnRef idx="2">
+            <a:schemeClr val="accent1"/>
+          </a:lnRef>
+          <a:fillRef idx="0">
+            <a:schemeClr val="accent1"/>
+          </a:fillRef>
+          <a:effectRef idx="1">
+            <a:schemeClr val="accent1"/>
+          </a:effectRef>
+          <a:fontRef idx="minor">
+            <a:schemeClr val="tx1"/>
+          </a:fontRef>
+        </p:style>
+      </p:cxnSp>
+      <p:cxnSp>
+        <p:nvCxnSpPr>
+          <p:cNvPr id="18" name="Straight Connector 17"/>
+          <p:cNvCxnSpPr/>
+          <p:nvPr/>
+        </p:nvCxnSpPr>
+        <p:spPr>
+          <a:xfrm flipH="1">
+            <a:off x="5561204" y="2549801"/>
+            <a:ext cx="1" cy="2219557"/>
+          </a:xfrm>
+          <a:prstGeom prst="line">
+            <a:avLst/>
+          </a:prstGeom>
+        </p:spPr>
+        <p:style>
+          <a:lnRef idx="2">
+            <a:schemeClr val="accent1"/>
+          </a:lnRef>
+          <a:fillRef idx="0">
+            <a:schemeClr val="accent1"/>
+          </a:fillRef>
+          <a:effectRef idx="1">
+            <a:schemeClr val="accent1"/>
+          </a:effectRef>
+          <a:fontRef idx="minor">
+            <a:schemeClr val="tx1"/>
+          </a:fontRef>
+        </p:style>
+      </p:cxnSp>
+      <p:sp>
+        <p:nvSpPr>
+          <p:cNvPr id="20" name="Rectangle 19"/>
+          <p:cNvSpPr/>
+          <p:nvPr/>
+        </p:nvSpPr>
+        <p:spPr>
+          <a:xfrm>
+            <a:off x="5522184" y="3429000"/>
+            <a:ext cx="305943" cy="369332"/>
+          </a:xfrm>
+          <a:prstGeom prst="rect">
+            <a:avLst/>
+          </a:prstGeom>
+        </p:spPr>
+        <p:txBody>
+          <a:bodyPr wrap="none">
+            <a:spAutoFit/>
+          </a:bodyPr>
+          <a:lstStyle/>
+          <a:p>
+            <a:r>
+              <a:rPr lang="en-US" dirty="0" smtClean="0"/>
+              <a:t>n</a:t>
+            </a:r>
+            <a:endParaRPr lang="en-US" dirty="0"/>
+          </a:p>
+        </p:txBody>
+      </p:sp>
+    </p:spTree>
+    <p:extLst>
+      <p:ext uri="{BB962C8B-B14F-4D97-AF65-F5344CB8AC3E}">
+        <p14:creationId xmlns:p14="http://schemas.microsoft.com/office/powerpoint/2010/main" val="1260007286"/>
+      </p:ext>
+    </p:extLst>
+  </p:cSld>
+  <p:clrMapOvr>
+    <a:masterClrMapping/>
+  </p:clrMapOvr>
+</p:sld>
+</file>
+
+<file path=ppt/slides/slide11.xml><?xml version="1.0" encoding="utf-8"?>
+<p:sld xmlns:a="http://schemas.openxmlformats.org/drawingml/2006/main" xmlns:r="http://schemas.openxmlformats.org/officeDocument/2006/relationships" xmlns:p="http://schemas.openxmlformats.org/presentationml/2006/main">
+  <p:cSld>
+    <p:spTree>
+      <p:nvGrpSpPr>
+        <p:cNvPr id="1" name=""/>
+        <p:cNvGrpSpPr/>
+        <p:nvPr/>
+      </p:nvGrpSpPr>
+      <p:grpSpPr>
+        <a:xfrm>
+          <a:off x="0" y="0"/>
+          <a:ext cx="0" cy="0"/>
+          <a:chOff x="0" y="0"/>
+          <a:chExt cx="0" cy="0"/>
+        </a:xfrm>
+      </p:grpSpPr>
+      <p:sp>
+        <p:nvSpPr>
+          <p:cNvPr id="2" name="Title 1"/>
+          <p:cNvSpPr>
+            <a:spLocks noGrp="1"/>
+          </p:cNvSpPr>
+          <p:nvPr>
+            <p:ph type="title"/>
+          </p:nvPr>
+        </p:nvSpPr>
+        <p:spPr/>
+        <p:txBody>
+          <a:bodyPr/>
+          <a:lstStyle/>
+          <a:p>
+            <a:r>
+              <a:rPr lang="en-US" dirty="0" smtClean="0"/>
+              <a:t>Variable Packet Size</a:t>
+            </a:r>
+            <a:endParaRPr lang="en-US" dirty="0"/>
+          </a:p>
+        </p:txBody>
+      </p:sp>
+      <p:pic>
+        <p:nvPicPr>
+          <p:cNvPr id="4" name="Picture 3" descr="dcf_model_unsaturated_varpktsize.png"/>
+          <p:cNvPicPr>
+            <a:picLocks noChangeAspect="1"/>
+          </p:cNvPicPr>
+          <p:nvPr/>
+        </p:nvPicPr>
+        <p:blipFill>
+          <a:blip r:embed="rId2">
+            <a:extLst>
+              <a:ext uri="{28A0092B-C50C-407E-A947-70E740481C1C}">
+                <a14:useLocalDpi xmlns:a14="http://schemas.microsoft.com/office/drawing/2010/main" val="0"/>
+              </a:ext>
+            </a:extLst>
+          </a:blip>
+          <a:stretch>
+            <a:fillRect/>
+          </a:stretch>
+        </p:blipFill>
+        <p:spPr>
+          <a:xfrm>
+            <a:off x="1231393" y="1337442"/>
+            <a:ext cx="6869881" cy="5318498"/>
+          </a:xfrm>
+          <a:prstGeom prst="rect">
+            <a:avLst/>
+          </a:prstGeom>
+        </p:spPr>
+      </p:pic>
+    </p:spTree>
+    <p:extLst>
+      <p:ext uri="{BB962C8B-B14F-4D97-AF65-F5344CB8AC3E}">
+        <p14:creationId xmlns:p14="http://schemas.microsoft.com/office/powerpoint/2010/main" val="2057849949"/>
+      </p:ext>
+    </p:extLst>
+  </p:cSld>
+  <p:clrMapOvr>
+    <a:masterClrMapping/>
+  </p:clrMapOvr>
+</p:sld>
+</file>
+
+<file path=ppt/slides/slide12.xml><?xml version="1.0" encoding="utf-8"?>
+<p:sld xmlns:a="http://schemas.openxmlformats.org/drawingml/2006/main" xmlns:r="http://schemas.openxmlformats.org/officeDocument/2006/relationships" xmlns:p="http://schemas.openxmlformats.org/presentationml/2006/main">
+  <p:cSld>
+    <p:spTree>
+      <p:nvGrpSpPr>
+        <p:cNvPr id="1" name=""/>
+        <p:cNvGrpSpPr/>
+        <p:nvPr/>
+      </p:nvGrpSpPr>
+      <p:grpSpPr>
+        <a:xfrm>
+          <a:off x="0" y="0"/>
+          <a:ext cx="0" cy="0"/>
+          <a:chOff x="0" y="0"/>
+          <a:chExt cx="0" cy="0"/>
+        </a:xfrm>
+      </p:grpSpPr>
+      <p:pic>
+        <p:nvPicPr>
+          <p:cNvPr id="4" name="Picture 3" descr="dcf_model_unsaturated_varpktsize_interarrival.png"/>
+          <p:cNvPicPr>
+            <a:picLocks noChangeAspect="1"/>
+          </p:cNvPicPr>
+          <p:nvPr/>
+        </p:nvPicPr>
+        <p:blipFill>
+          <a:blip r:embed="rId2">
+            <a:extLst>
+              <a:ext uri="{28A0092B-C50C-407E-A947-70E740481C1C}">
+                <a14:useLocalDpi xmlns:a14="http://schemas.microsoft.com/office/drawing/2010/main" val="0"/>
+              </a:ext>
+            </a:extLst>
+          </a:blip>
+          <a:stretch>
+            <a:fillRect/>
+          </a:stretch>
+        </p:blipFill>
+        <p:spPr>
+          <a:xfrm>
+            <a:off x="1437970" y="1048786"/>
+            <a:ext cx="6153366" cy="5809214"/>
+          </a:xfrm>
+          <a:prstGeom prst="rect">
+            <a:avLst/>
+          </a:prstGeom>
+        </p:spPr>
+      </p:pic>
+      <p:sp>
+        <p:nvSpPr>
+          <p:cNvPr id="2" name="Title 1"/>
+          <p:cNvSpPr>
+            <a:spLocks noGrp="1"/>
+          </p:cNvSpPr>
+          <p:nvPr>
+            <p:ph type="title"/>
+          </p:nvPr>
+        </p:nvSpPr>
+        <p:spPr/>
+        <p:txBody>
+          <a:bodyPr/>
+          <a:lstStyle/>
+          <a:p>
+            <a:r>
+              <a:rPr lang="en-US" dirty="0" err="1" smtClean="0"/>
+              <a:t>Interarrival</a:t>
+            </a:r>
+            <a:r>
+              <a:rPr lang="en-US" dirty="0" smtClean="0"/>
+              <a:t> Time</a:t>
+            </a:r>
+            <a:endParaRPr lang="en-US" dirty="0"/>
+          </a:p>
+        </p:txBody>
+      </p:sp>
+    </p:spTree>
+    <p:extLst>
+      <p:ext uri="{BB962C8B-B14F-4D97-AF65-F5344CB8AC3E}">
+        <p14:creationId xmlns:p14="http://schemas.microsoft.com/office/powerpoint/2010/main" val="3186502486"/>
+      </p:ext>
+    </p:extLst>
+  </p:cSld>
+  <p:clrMapOvr>
+    <a:masterClrMapping/>
+  </p:clrMapOvr>
+</p:sld>
+</file>
+
+<file path=ppt/slides/slide13.xml><?xml version="1.0" encoding="utf-8"?>
+<p:sld xmlns:a="http://schemas.openxmlformats.org/drawingml/2006/main" xmlns:r="http://schemas.openxmlformats.org/officeDocument/2006/relationships" xmlns:p="http://schemas.openxmlformats.org/presentationml/2006/main">
+  <p:cSld>
+    <p:spTree>
+      <p:nvGrpSpPr>
+        <p:cNvPr id="1" name=""/>
+        <p:cNvGrpSpPr/>
+        <p:nvPr/>
+      </p:nvGrpSpPr>
+      <p:grpSpPr>
+        <a:xfrm>
+          <a:off x="0" y="0"/>
+          <a:ext cx="0" cy="0"/>
+          <a:chOff x="0" y="0"/>
+          <a:chExt cx="0" cy="0"/>
+        </a:xfrm>
+      </p:grpSpPr>
+      <p:sp>
+        <p:nvSpPr>
+          <p:cNvPr id="2" name="Title 1"/>
+          <p:cNvSpPr>
+            <a:spLocks noGrp="1"/>
+          </p:cNvSpPr>
+          <p:nvPr>
+            <p:ph type="title"/>
+          </p:nvPr>
+        </p:nvSpPr>
+        <p:spPr/>
+        <p:txBody>
+          <a:bodyPr/>
+          <a:lstStyle/>
+          <a:p>
+            <a:r>
+              <a:rPr lang="en-US" dirty="0" smtClean="0"/>
+              <a:t>Varying Packet Types</a:t>
+            </a:r>
+            <a:endParaRPr lang="en-US" dirty="0"/>
+          </a:p>
+        </p:txBody>
+      </p:sp>
+      <p:sp>
+        <p:nvSpPr>
+          <p:cNvPr id="3" name="Content Placeholder 2"/>
+          <p:cNvSpPr>
+            <a:spLocks noGrp="1"/>
+          </p:cNvSpPr>
+          <p:nvPr>
+            <p:ph idx="1"/>
+          </p:nvPr>
+        </p:nvSpPr>
+        <p:spPr/>
+        <p:txBody>
+          <a:bodyPr>
+            <a:normAutofit lnSpcReduction="10000"/>
+          </a:bodyPr>
+          <a:lstStyle/>
+          <a:p>
+            <a:r>
+              <a:rPr lang="en-US" dirty="0" smtClean="0"/>
+              <a:t>Packet types differ in size and frequency of arrival</a:t>
+            </a:r>
+          </a:p>
+          <a:p>
+            <a:pPr lvl="1"/>
+            <a:r>
+              <a:rPr lang="en-US" dirty="0" smtClean="0"/>
+              <a:t>E.g., video I packets are larger and less frequent than smaller D packets</a:t>
+            </a:r>
+          </a:p>
+          <a:p>
+            <a:r>
+              <a:rPr lang="en-US" dirty="0" smtClean="0"/>
+              <a:t>Each packet type has a “fixed” packet size, decided at the beginning of the lifetime of the packet</a:t>
+            </a:r>
+          </a:p>
+          <a:p>
+            <a:pPr lvl="1"/>
+            <a:endParaRPr lang="en-US" dirty="0" smtClean="0"/>
+          </a:p>
+          <a:p>
+            <a:r>
+              <a:rPr lang="en-US" dirty="0" smtClean="0"/>
+              <a:t>Packet type transitions are deterministic</a:t>
+            </a:r>
+          </a:p>
+        </p:txBody>
+      </p:sp>
+    </p:spTree>
+    <p:extLst>
+      <p:ext uri="{BB962C8B-B14F-4D97-AF65-F5344CB8AC3E}">
+        <p14:creationId xmlns:p14="http://schemas.microsoft.com/office/powerpoint/2010/main" val="1552303845"/>
+      </p:ext>
+    </p:extLst>
+  </p:cSld>
+  <p:clrMapOvr>
+    <a:masterClrMapping/>
+  </p:clrMapOvr>
+</p:sld>
+</file>
+
+<file path=ppt/slides/slide14.xml><?xml version="1.0" encoding="utf-8"?>
+<p:sld xmlns:a="http://schemas.openxmlformats.org/drawingml/2006/main" xmlns:r="http://schemas.openxmlformats.org/officeDocument/2006/relationships" xmlns:p="http://schemas.openxmlformats.org/presentationml/2006/main">
+  <p:cSld>
+    <p:spTree>
+      <p:nvGrpSpPr>
+        <p:cNvPr id="1" name=""/>
+        <p:cNvGrpSpPr/>
+        <p:nvPr/>
+      </p:nvGrpSpPr>
+      <p:grpSpPr>
+        <a:xfrm>
+          <a:off x="0" y="0"/>
+          <a:ext cx="0" cy="0"/>
+          <a:chOff x="0" y="0"/>
+          <a:chExt cx="0" cy="0"/>
+        </a:xfrm>
+      </p:grpSpPr>
+      <p:sp>
+        <p:nvSpPr>
+          <p:cNvPr id="2" name="Title 1"/>
+          <p:cNvSpPr>
+            <a:spLocks noGrp="1"/>
+          </p:cNvSpPr>
+          <p:nvPr>
+            <p:ph type="title"/>
+          </p:nvPr>
+        </p:nvSpPr>
+        <p:spPr/>
+        <p:txBody>
+          <a:bodyPr/>
+          <a:lstStyle/>
+          <a:p>
+            <a:r>
+              <a:rPr lang="en-US" dirty="0" smtClean="0"/>
+              <a:t>Web Traffic</a:t>
+            </a:r>
+            <a:endParaRPr lang="en-US" dirty="0"/>
+          </a:p>
+        </p:txBody>
+      </p:sp>
+      <p:sp>
+        <p:nvSpPr>
+          <p:cNvPr id="3" name="Content Placeholder 2"/>
+          <p:cNvSpPr>
+            <a:spLocks noGrp="1"/>
+          </p:cNvSpPr>
+          <p:nvPr>
+            <p:ph idx="1"/>
+          </p:nvPr>
+        </p:nvSpPr>
+        <p:spPr/>
+        <p:txBody>
+          <a:bodyPr/>
+          <a:lstStyle/>
+          <a:p>
+            <a:r>
+              <a:rPr lang="en-US" dirty="0" smtClean="0"/>
+              <a:t>Primary characteristics</a:t>
+            </a:r>
+          </a:p>
+          <a:p>
+            <a:pPr lvl="1"/>
+            <a:r>
+              <a:rPr lang="en-US" dirty="0" smtClean="0"/>
+              <a:t>Randomly sized packets</a:t>
+            </a:r>
+          </a:p>
+          <a:p>
+            <a:pPr lvl="1"/>
+            <a:r>
+              <a:rPr lang="en-US" dirty="0" smtClean="0"/>
+              <a:t>Random </a:t>
+            </a:r>
+            <a:r>
+              <a:rPr lang="en-US" dirty="0" err="1" smtClean="0"/>
+              <a:t>interarrival</a:t>
+            </a:r>
+            <a:r>
+              <a:rPr lang="en-US" dirty="0" smtClean="0"/>
+              <a:t> time</a:t>
+            </a:r>
+          </a:p>
+          <a:p>
+            <a:r>
+              <a:rPr lang="en-US" dirty="0" smtClean="0"/>
+              <a:t>Parameters to tune:</a:t>
+            </a:r>
+          </a:p>
+          <a:p>
+            <a:pPr lvl="1"/>
+            <a:r>
+              <a:rPr lang="en-US" dirty="0" smtClean="0"/>
+              <a:t>Packet size (random)</a:t>
+            </a:r>
+          </a:p>
+          <a:p>
+            <a:pPr lvl="1"/>
+            <a:r>
+              <a:rPr lang="en-US" dirty="0" err="1" smtClean="0"/>
+              <a:t>Interarrival</a:t>
+            </a:r>
+            <a:r>
+              <a:rPr lang="en-US" dirty="0" smtClean="0"/>
+              <a:t> time (random)</a:t>
+            </a:r>
+            <a:endParaRPr lang="en-US" dirty="0"/>
+          </a:p>
+        </p:txBody>
+      </p:sp>
+    </p:spTree>
+    <p:extLst>
+      <p:ext uri="{BB962C8B-B14F-4D97-AF65-F5344CB8AC3E}">
+        <p14:creationId xmlns:p14="http://schemas.microsoft.com/office/powerpoint/2010/main" val="289021001"/>
+      </p:ext>
+    </p:extLst>
+  </p:cSld>
+  <p:clrMapOvr>
+    <a:masterClrMapping/>
+  </p:clrMapOvr>
+</p:sld>
+</file>
+
+<file path=ppt/slides/slide15.xml><?xml version="1.0" encoding="utf-8"?>
+<p:sld xmlns:a="http://schemas.openxmlformats.org/drawingml/2006/main" xmlns:r="http://schemas.openxmlformats.org/officeDocument/2006/relationships" xmlns:p="http://schemas.openxmlformats.org/presentationml/2006/main">
+  <p:cSld>
+    <p:spTree>
+      <p:nvGrpSpPr>
+        <p:cNvPr id="1" name=""/>
+        <p:cNvGrpSpPr/>
+        <p:nvPr/>
+      </p:nvGrpSpPr>
+      <p:grpSpPr>
+        <a:xfrm>
+          <a:off x="0" y="0"/>
+          <a:ext cx="0" cy="0"/>
+          <a:chOff x="0" y="0"/>
+          <a:chExt cx="0" cy="0"/>
+        </a:xfrm>
+      </p:grpSpPr>
+      <p:sp>
+        <p:nvSpPr>
+          <p:cNvPr id="2" name="Title 1"/>
+          <p:cNvSpPr>
+            <a:spLocks noGrp="1"/>
+          </p:cNvSpPr>
+          <p:nvPr>
+            <p:ph type="title"/>
+          </p:nvPr>
+        </p:nvSpPr>
+        <p:spPr/>
+        <p:txBody>
+          <a:bodyPr/>
+          <a:lstStyle/>
+          <a:p>
+            <a:r>
+              <a:rPr lang="en-US" dirty="0" smtClean="0"/>
+              <a:t>Web Traffic Illustrated</a:t>
+            </a:r>
+            <a:endParaRPr lang="en-US" dirty="0"/>
+          </a:p>
+        </p:txBody>
+      </p:sp>
+      <p:sp>
+        <p:nvSpPr>
+          <p:cNvPr id="3" name="Content Placeholder 2"/>
+          <p:cNvSpPr>
+            <a:spLocks noGrp="1"/>
+          </p:cNvSpPr>
+          <p:nvPr>
+            <p:ph idx="1"/>
+          </p:nvPr>
+        </p:nvSpPr>
+        <p:spPr/>
+        <p:txBody>
+          <a:bodyPr/>
+          <a:lstStyle/>
+          <a:p>
+            <a:r>
+              <a:rPr lang="en-US" dirty="0" err="1"/>
+              <a:t>Timeseries</a:t>
+            </a:r>
+            <a:r>
+              <a:rPr lang="en-US" dirty="0"/>
+              <a:t> image here</a:t>
+            </a:r>
+          </a:p>
+          <a:p>
+            <a:endParaRPr lang="en-US" dirty="0"/>
+          </a:p>
+        </p:txBody>
+      </p:sp>
+    </p:spTree>
+    <p:extLst>
+      <p:ext uri="{BB962C8B-B14F-4D97-AF65-F5344CB8AC3E}">
+        <p14:creationId xmlns:p14="http://schemas.microsoft.com/office/powerpoint/2010/main" val="841357015"/>
+      </p:ext>
+    </p:extLst>
+  </p:cSld>
+  <p:clrMapOvr>
+    <a:masterClrMapping/>
+  </p:clrMapOvr>
+</p:sld>
+</file>
+
+<file path=ppt/slides/slide16.xml><?xml version="1.0" encoding="utf-8"?>
+<p:sld xmlns:a="http://schemas.openxmlformats.org/drawingml/2006/main" xmlns:r="http://schemas.openxmlformats.org/officeDocument/2006/relationships" xmlns:p="http://schemas.openxmlformats.org/presentationml/2006/main">
+  <p:cSld>
+    <p:spTree>
+      <p:nvGrpSpPr>
+        <p:cNvPr id="1" name=""/>
+        <p:cNvGrpSpPr/>
+        <p:nvPr/>
+      </p:nvGrpSpPr>
+      <p:grpSpPr>
+        <a:xfrm>
+          <a:off x="0" y="0"/>
+          <a:ext cx="0" cy="0"/>
+          <a:chOff x="0" y="0"/>
+          <a:chExt cx="0" cy="0"/>
+        </a:xfrm>
+      </p:grpSpPr>
+      <p:sp>
+        <p:nvSpPr>
+          <p:cNvPr id="2" name="Title 1"/>
+          <p:cNvSpPr>
+            <a:spLocks noGrp="1"/>
+          </p:cNvSpPr>
+          <p:nvPr>
+            <p:ph type="title"/>
+          </p:nvPr>
+        </p:nvSpPr>
+        <p:spPr/>
+        <p:txBody>
+          <a:bodyPr/>
+          <a:lstStyle/>
+          <a:p>
+            <a:r>
+              <a:rPr lang="en-US" dirty="0" smtClean="0"/>
+              <a:t>File Downloads</a:t>
+            </a:r>
+            <a:endParaRPr lang="en-US" dirty="0"/>
+          </a:p>
+        </p:txBody>
+      </p:sp>
+      <p:sp>
+        <p:nvSpPr>
+          <p:cNvPr id="3" name="Content Placeholder 2"/>
+          <p:cNvSpPr>
+            <a:spLocks noGrp="1"/>
+          </p:cNvSpPr>
+          <p:nvPr>
+            <p:ph idx="1"/>
+          </p:nvPr>
+        </p:nvSpPr>
+        <p:spPr/>
+        <p:txBody>
+          <a:bodyPr/>
+          <a:lstStyle/>
+          <a:p>
+            <a:r>
+              <a:rPr lang="en-US" dirty="0" smtClean="0"/>
+              <a:t>Primary characteristics:</a:t>
+            </a:r>
+          </a:p>
+          <a:p>
+            <a:pPr lvl="1"/>
+            <a:r>
+              <a:rPr lang="en-US" dirty="0" smtClean="0"/>
+              <a:t>Long periods of activity and long inter-burst time</a:t>
+            </a:r>
+          </a:p>
+          <a:p>
+            <a:pPr lvl="1"/>
+            <a:r>
+              <a:rPr lang="en-US" dirty="0" smtClean="0"/>
+              <a:t>Usually large packet sizes</a:t>
+            </a:r>
+          </a:p>
+          <a:p>
+            <a:r>
+              <a:rPr lang="en-US" dirty="0" smtClean="0"/>
+              <a:t>Parameters to tune:</a:t>
+            </a:r>
+          </a:p>
+          <a:p>
+            <a:pPr lvl="1"/>
+            <a:r>
+              <a:rPr lang="en-US" dirty="0" smtClean="0"/>
+              <a:t>Packet size (high)</a:t>
+            </a:r>
+          </a:p>
+          <a:p>
+            <a:pPr lvl="1"/>
+            <a:r>
+              <a:rPr lang="en-US" dirty="0" smtClean="0"/>
+              <a:t>Queue arrival time (long)</a:t>
+            </a:r>
+          </a:p>
+          <a:p>
+            <a:pPr lvl="1"/>
+            <a:r>
+              <a:rPr lang="en-US" dirty="0" err="1" smtClean="0"/>
+              <a:t>Interarrival</a:t>
+            </a:r>
+            <a:r>
+              <a:rPr lang="en-US" dirty="0" smtClean="0"/>
+              <a:t> time (short)</a:t>
+            </a:r>
+            <a:endParaRPr lang="en-US" dirty="0"/>
+          </a:p>
+        </p:txBody>
+      </p:sp>
+    </p:spTree>
+    <p:extLst>
+      <p:ext uri="{BB962C8B-B14F-4D97-AF65-F5344CB8AC3E}">
+        <p14:creationId xmlns:p14="http://schemas.microsoft.com/office/powerpoint/2010/main" val="3951976114"/>
+      </p:ext>
+    </p:extLst>
+  </p:cSld>
+  <p:clrMapOvr>
+    <a:masterClrMapping/>
+  </p:clrMapOvr>
+</p:sld>
+</file>
+
+<file path=ppt/slides/slide17.xml><?xml version="1.0" encoding="utf-8"?>
+<p:sld xmlns:a="http://schemas.openxmlformats.org/drawingml/2006/main" xmlns:r="http://schemas.openxmlformats.org/officeDocument/2006/relationships" xmlns:p="http://schemas.openxmlformats.org/presentationml/2006/main">
+  <p:cSld>
+    <p:spTree>
+      <p:nvGrpSpPr>
+        <p:cNvPr id="1" name=""/>
+        <p:cNvGrpSpPr/>
+        <p:nvPr/>
+      </p:nvGrpSpPr>
+      <p:grpSpPr>
+        <a:xfrm>
+          <a:off x="0" y="0"/>
+          <a:ext cx="0" cy="0"/>
+          <a:chOff x="0" y="0"/>
+          <a:chExt cx="0" cy="0"/>
+        </a:xfrm>
+      </p:grpSpPr>
+      <p:sp>
+        <p:nvSpPr>
+          <p:cNvPr id="2" name="Title 1"/>
+          <p:cNvSpPr>
+            <a:spLocks noGrp="1"/>
+          </p:cNvSpPr>
+          <p:nvPr>
+            <p:ph type="title"/>
+          </p:nvPr>
+        </p:nvSpPr>
+        <p:spPr/>
+        <p:txBody>
+          <a:bodyPr/>
+          <a:lstStyle/>
+          <a:p>
+            <a:r>
+              <a:rPr lang="en-US" dirty="0" smtClean="0"/>
+              <a:t>File Downloads Illustrated</a:t>
+            </a:r>
+            <a:endParaRPr lang="en-US" dirty="0"/>
+          </a:p>
+        </p:txBody>
+      </p:sp>
+      <p:sp>
+        <p:nvSpPr>
+          <p:cNvPr id="3" name="Content Placeholder 2"/>
+          <p:cNvSpPr>
+            <a:spLocks noGrp="1"/>
+          </p:cNvSpPr>
+          <p:nvPr>
+            <p:ph idx="1"/>
+          </p:nvPr>
+        </p:nvSpPr>
+        <p:spPr/>
+        <p:txBody>
+          <a:bodyPr/>
+          <a:lstStyle/>
+          <a:p>
+            <a:r>
+              <a:rPr lang="en-US" dirty="0" err="1"/>
+              <a:t>Timeseries</a:t>
+            </a:r>
+            <a:r>
+              <a:rPr lang="en-US" dirty="0"/>
+              <a:t> image here</a:t>
+            </a:r>
+          </a:p>
+          <a:p>
+            <a:endParaRPr lang="en-US" dirty="0"/>
+          </a:p>
+        </p:txBody>
+      </p:sp>
+    </p:spTree>
+    <p:extLst>
+      <p:ext uri="{BB962C8B-B14F-4D97-AF65-F5344CB8AC3E}">
+        <p14:creationId xmlns:p14="http://schemas.microsoft.com/office/powerpoint/2010/main" val="1134954466"/>
+      </p:ext>
+    </p:extLst>
+  </p:cSld>
+  <p:clrMapOvr>
+    <a:masterClrMapping/>
+  </p:clrMapOvr>
+</p:sld>
+</file>
+
+<file path=ppt/slides/slide18.xml><?xml version="1.0" encoding="utf-8"?>
+<p:sld xmlns:a="http://schemas.openxmlformats.org/drawingml/2006/main" xmlns:r="http://schemas.openxmlformats.org/officeDocument/2006/relationships" xmlns:p="http://schemas.openxmlformats.org/presentationml/2006/main">
+  <p:cSld>
+    <p:spTree>
+      <p:nvGrpSpPr>
+        <p:cNvPr id="1" name=""/>
+        <p:cNvGrpSpPr/>
+        <p:nvPr/>
+      </p:nvGrpSpPr>
+      <p:grpSpPr>
+        <a:xfrm>
+          <a:off x="0" y="0"/>
+          <a:ext cx="0" cy="0"/>
+          <a:chOff x="0" y="0"/>
+          <a:chExt cx="0" cy="0"/>
+        </a:xfrm>
+      </p:grpSpPr>
+      <p:sp>
+        <p:nvSpPr>
+          <p:cNvPr id="2" name="Title 1"/>
+          <p:cNvSpPr>
+            <a:spLocks noGrp="1"/>
+          </p:cNvSpPr>
+          <p:nvPr>
+            <p:ph type="title"/>
+          </p:nvPr>
+        </p:nvSpPr>
+        <p:spPr/>
+        <p:txBody>
+          <a:bodyPr/>
+          <a:lstStyle/>
+          <a:p>
+            <a:r>
+              <a:rPr lang="en-US" dirty="0" smtClean="0"/>
+              <a:t>Multimedia Traffic</a:t>
+            </a:r>
+            <a:endParaRPr lang="en-US" dirty="0"/>
+          </a:p>
+        </p:txBody>
+      </p:sp>
+      <p:sp>
+        <p:nvSpPr>
+          <p:cNvPr id="3" name="Content Placeholder 2"/>
+          <p:cNvSpPr>
+            <a:spLocks noGrp="1"/>
+          </p:cNvSpPr>
+          <p:nvPr>
+            <p:ph idx="1"/>
+          </p:nvPr>
+        </p:nvSpPr>
+        <p:spPr/>
+        <p:txBody>
+          <a:bodyPr/>
+          <a:lstStyle/>
+          <a:p>
+            <a:r>
+              <a:rPr lang="en-US" dirty="0" smtClean="0"/>
+              <a:t>Primary characteristics:</a:t>
+            </a:r>
+          </a:p>
+          <a:p>
+            <a:pPr lvl="1"/>
+            <a:r>
+              <a:rPr lang="en-US" dirty="0" smtClean="0"/>
+              <a:t>Streams of different types of packets, each of a different length</a:t>
+            </a:r>
+          </a:p>
+          <a:p>
+            <a:pPr lvl="2"/>
+            <a:r>
+              <a:rPr lang="en-US" dirty="0" smtClean="0"/>
+              <a:t>E.g., Big I frames (packets) and many small D packets</a:t>
+            </a:r>
+          </a:p>
+          <a:p>
+            <a:r>
+              <a:rPr lang="en-US" dirty="0" smtClean="0"/>
+              <a:t>Parameters to tune:</a:t>
+            </a:r>
+          </a:p>
+          <a:p>
+            <a:pPr lvl="1"/>
+            <a:r>
+              <a:rPr lang="en-US" dirty="0" smtClean="0"/>
+              <a:t>Packet size</a:t>
+            </a:r>
+          </a:p>
+          <a:p>
+            <a:pPr lvl="1"/>
+            <a:r>
+              <a:rPr lang="en-US" dirty="0" smtClean="0"/>
+              <a:t>Packet type</a:t>
+            </a:r>
+            <a:endParaRPr lang="en-US" dirty="0"/>
+          </a:p>
+        </p:txBody>
+      </p:sp>
+    </p:spTree>
+    <p:extLst>
+      <p:ext uri="{BB962C8B-B14F-4D97-AF65-F5344CB8AC3E}">
+        <p14:creationId xmlns:p14="http://schemas.microsoft.com/office/powerpoint/2010/main" val="1352096163"/>
+      </p:ext>
+    </p:extLst>
+  </p:cSld>
+  <p:clrMapOvr>
+    <a:masterClrMapping/>
+  </p:clrMapOvr>
+</p:sld>
+</file>
+
+<file path=ppt/slides/slide19.xml><?xml version="1.0" encoding="utf-8"?>
+<p:sld xmlns:a="http://schemas.openxmlformats.org/drawingml/2006/main" xmlns:r="http://schemas.openxmlformats.org/officeDocument/2006/relationships" xmlns:p="http://schemas.openxmlformats.org/presentationml/2006/main">
+  <p:cSld>
+    <p:spTree>
+      <p:nvGrpSpPr>
+        <p:cNvPr id="1" name=""/>
+        <p:cNvGrpSpPr/>
+        <p:nvPr/>
+      </p:nvGrpSpPr>
+      <p:grpSpPr>
+        <a:xfrm>
+          <a:off x="0" y="0"/>
+          <a:ext cx="0" cy="0"/>
+          <a:chOff x="0" y="0"/>
+          <a:chExt cx="0" cy="0"/>
+        </a:xfrm>
+      </p:grpSpPr>
+      <p:sp>
+        <p:nvSpPr>
+          <p:cNvPr id="2" name="Title 1"/>
+          <p:cNvSpPr>
+            <a:spLocks noGrp="1"/>
+          </p:cNvSpPr>
+          <p:nvPr>
+            <p:ph type="title"/>
+          </p:nvPr>
+        </p:nvSpPr>
+        <p:spPr/>
+        <p:txBody>
+          <a:bodyPr/>
+          <a:lstStyle/>
+          <a:p>
+            <a:r>
+              <a:rPr lang="en-US" dirty="0" smtClean="0"/>
+              <a:t>Multimedia Illustrated</a:t>
+            </a:r>
+            <a:endParaRPr lang="en-US" dirty="0"/>
+          </a:p>
+        </p:txBody>
+      </p:sp>
+      <p:sp>
+        <p:nvSpPr>
+          <p:cNvPr id="3" name="Content Placeholder 2"/>
+          <p:cNvSpPr>
+            <a:spLocks noGrp="1"/>
+          </p:cNvSpPr>
+          <p:nvPr>
+            <p:ph idx="1"/>
+          </p:nvPr>
+        </p:nvSpPr>
+        <p:spPr/>
+        <p:txBody>
+          <a:bodyPr/>
+          <a:lstStyle/>
+          <a:p>
+            <a:r>
+              <a:rPr lang="en-US" dirty="0" err="1" smtClean="0"/>
+              <a:t>Timeseries</a:t>
+            </a:r>
+            <a:r>
+              <a:rPr lang="en-US" dirty="0" smtClean="0"/>
+              <a:t> image here</a:t>
+            </a:r>
+            <a:endParaRPr lang="en-US" dirty="0"/>
+          </a:p>
+        </p:txBody>
+      </p:sp>
+    </p:spTree>
+    <p:extLst>
+      <p:ext uri="{BB962C8B-B14F-4D97-AF65-F5344CB8AC3E}">
+        <p14:creationId xmlns:p14="http://schemas.microsoft.com/office/powerpoint/2010/main" val="807016509"/>
       </p:ext>
     </p:extLst>
   </p:cSld>
@@ -3291,6 +4554,193 @@
 </p:sld>
 </file>
 
+<file path=ppt/slides/slide20.xml><?xml version="1.0" encoding="utf-8"?>
+<p:sld xmlns:a="http://schemas.openxmlformats.org/drawingml/2006/main" xmlns:r="http://schemas.openxmlformats.org/officeDocument/2006/relationships" xmlns:p="http://schemas.openxmlformats.org/presentationml/2006/main">
+  <p:cSld>
+    <p:spTree>
+      <p:nvGrpSpPr>
+        <p:cNvPr id="1" name=""/>
+        <p:cNvGrpSpPr/>
+        <p:nvPr/>
+      </p:nvGrpSpPr>
+      <p:grpSpPr>
+        <a:xfrm>
+          <a:off x="0" y="0"/>
+          <a:ext cx="0" cy="0"/>
+          <a:chOff x="0" y="0"/>
+          <a:chExt cx="0" cy="0"/>
+        </a:xfrm>
+      </p:grpSpPr>
+      <p:sp>
+        <p:nvSpPr>
+          <p:cNvPr id="2" name="Title 1"/>
+          <p:cNvSpPr>
+            <a:spLocks noGrp="1"/>
+          </p:cNvSpPr>
+          <p:nvPr>
+            <p:ph type="title"/>
+          </p:nvPr>
+        </p:nvSpPr>
+        <p:spPr/>
+        <p:txBody>
+          <a:bodyPr/>
+          <a:lstStyle/>
+          <a:p>
+            <a:r>
+              <a:rPr lang="en-US" dirty="0" smtClean="0"/>
+              <a:t>Experimental Metrics</a:t>
+            </a:r>
+            <a:endParaRPr lang="en-US" dirty="0"/>
+          </a:p>
+        </p:txBody>
+      </p:sp>
+      <p:sp>
+        <p:nvSpPr>
+          <p:cNvPr id="3" name="Content Placeholder 2"/>
+          <p:cNvSpPr>
+            <a:spLocks noGrp="1"/>
+          </p:cNvSpPr>
+          <p:nvPr>
+            <p:ph idx="1"/>
+          </p:nvPr>
+        </p:nvSpPr>
+        <p:spPr/>
+        <p:txBody>
+          <a:bodyPr/>
+          <a:lstStyle/>
+          <a:p>
+            <a:r>
+              <a:rPr lang="en-US" dirty="0" smtClean="0"/>
+              <a:t>Average and individual node:</a:t>
+            </a:r>
+          </a:p>
+          <a:p>
+            <a:pPr lvl="1"/>
+            <a:r>
+              <a:rPr lang="en-US" dirty="0" smtClean="0"/>
+              <a:t>Throughput (cumulative and variance)</a:t>
+            </a:r>
+          </a:p>
+          <a:p>
+            <a:pPr lvl="1"/>
+            <a:r>
+              <a:rPr lang="en-US" dirty="0" smtClean="0"/>
+              <a:t>Idle time (</a:t>
+            </a:r>
+            <a:r>
+              <a:rPr lang="en-US" dirty="0" err="1" smtClean="0"/>
+              <a:t>backoff</a:t>
+            </a:r>
+            <a:r>
+              <a:rPr lang="en-US" dirty="0" smtClean="0"/>
+              <a:t>, post-</a:t>
+            </a:r>
+            <a:r>
+              <a:rPr lang="en-US" dirty="0" err="1" smtClean="0"/>
+              <a:t>backoff</a:t>
+            </a:r>
+            <a:r>
+              <a:rPr lang="en-US" dirty="0" smtClean="0"/>
+              <a:t>)</a:t>
+            </a:r>
+          </a:p>
+          <a:p>
+            <a:pPr lvl="1"/>
+            <a:r>
+              <a:rPr lang="en-US" dirty="0" smtClean="0"/>
+              <a:t>Packet transmit probability</a:t>
+            </a:r>
+          </a:p>
+          <a:p>
+            <a:pPr lvl="1"/>
+            <a:r>
+              <a:rPr lang="en-US" dirty="0" smtClean="0"/>
+              <a:t>Packet loss probability</a:t>
+            </a:r>
+          </a:p>
+        </p:txBody>
+      </p:sp>
+    </p:spTree>
+    <p:extLst>
+      <p:ext uri="{BB962C8B-B14F-4D97-AF65-F5344CB8AC3E}">
+        <p14:creationId xmlns:p14="http://schemas.microsoft.com/office/powerpoint/2010/main" val="2065468025"/>
+      </p:ext>
+    </p:extLst>
+  </p:cSld>
+  <p:clrMapOvr>
+    <a:masterClrMapping/>
+  </p:clrMapOvr>
+</p:sld>
+</file>
+
+<file path=ppt/slides/slide21.xml><?xml version="1.0" encoding="utf-8"?>
+<p:sld xmlns:a="http://schemas.openxmlformats.org/drawingml/2006/main" xmlns:r="http://schemas.openxmlformats.org/officeDocument/2006/relationships" xmlns:p="http://schemas.openxmlformats.org/presentationml/2006/main">
+  <p:cSld>
+    <p:spTree>
+      <p:nvGrpSpPr>
+        <p:cNvPr id="1" name=""/>
+        <p:cNvGrpSpPr/>
+        <p:nvPr/>
+      </p:nvGrpSpPr>
+      <p:grpSpPr>
+        <a:xfrm>
+          <a:off x="0" y="0"/>
+          <a:ext cx="0" cy="0"/>
+          <a:chOff x="0" y="0"/>
+          <a:chExt cx="0" cy="0"/>
+        </a:xfrm>
+      </p:grpSpPr>
+      <p:sp>
+        <p:nvSpPr>
+          <p:cNvPr id="2" name="Title 1"/>
+          <p:cNvSpPr>
+            <a:spLocks noGrp="1"/>
+          </p:cNvSpPr>
+          <p:nvPr>
+            <p:ph type="title"/>
+          </p:nvPr>
+        </p:nvSpPr>
+        <p:spPr/>
+        <p:txBody>
+          <a:bodyPr/>
+          <a:lstStyle/>
+          <a:p>
+            <a:endParaRPr lang="en-US"/>
+          </a:p>
+        </p:txBody>
+      </p:sp>
+      <p:sp>
+        <p:nvSpPr>
+          <p:cNvPr id="3" name="Content Placeholder 2"/>
+          <p:cNvSpPr>
+            <a:spLocks noGrp="1"/>
+          </p:cNvSpPr>
+          <p:nvPr>
+            <p:ph idx="1"/>
+          </p:nvPr>
+        </p:nvSpPr>
+        <p:spPr/>
+        <p:txBody>
+          <a:bodyPr/>
+          <a:lstStyle/>
+          <a:p>
+            <a:endParaRPr lang="en-US"/>
+          </a:p>
+        </p:txBody>
+      </p:sp>
+    </p:spTree>
+    <p:extLst>
+      <p:ext uri="{BB962C8B-B14F-4D97-AF65-F5344CB8AC3E}">
+        <p14:creationId xmlns:p14="http://schemas.microsoft.com/office/powerpoint/2010/main" val="2793871312"/>
+      </p:ext>
+    </p:extLst>
+  </p:cSld>
+  <p:clrMapOvr>
+    <a:masterClrMapping/>
+  </p:clrMapOvr>
+</p:sld>
+</file>
+
 <file path=ppt/slides/slide3.xml><?xml version="1.0" encoding="utf-8"?>
 <p:sld xmlns:a="http://schemas.openxmlformats.org/drawingml/2006/main" xmlns:r="http://schemas.openxmlformats.org/officeDocument/2006/relationships" xmlns:p="http://schemas.openxmlformats.org/presentationml/2006/main">
   <p:cSld>
@@ -3364,27 +4814,40 @@
             <a:pPr lvl="1"/>
             <a:r>
               <a:rPr lang="en-US" dirty="0" smtClean="0"/>
+              <a:t>Web </a:t>
+            </a:r>
+            <a:r>
+              <a:rPr lang="en-US" dirty="0" smtClean="0"/>
+              <a:t>browsing</a:t>
+            </a:r>
+          </a:p>
+          <a:p>
+            <a:pPr lvl="1"/>
+            <a:r>
+              <a:rPr lang="en-US" dirty="0" smtClean="0"/>
+              <a:t>File </a:t>
+            </a:r>
+            <a:r>
+              <a:rPr lang="en-US" dirty="0" smtClean="0"/>
+              <a:t>downloads</a:t>
+            </a:r>
+          </a:p>
+          <a:p>
+            <a:pPr lvl="1"/>
+            <a:r>
+              <a:rPr lang="en-US" dirty="0" smtClean="0"/>
               <a:t>VoIP (e.g., Skype)</a:t>
             </a:r>
-          </a:p>
-          <a:p>
-            <a:pPr lvl="1"/>
-            <a:r>
-              <a:rPr lang="en-US" dirty="0" smtClean="0"/>
-              <a:t>Web browsing</a:t>
-            </a:r>
-          </a:p>
-          <a:p>
-            <a:pPr lvl="1"/>
-            <a:r>
-              <a:rPr lang="en-US" dirty="0" smtClean="0"/>
-              <a:t>File downloads</a:t>
-            </a:r>
-          </a:p>
-          <a:p>
-            <a:r>
-              <a:rPr lang="en-US" dirty="0" smtClean="0"/>
-              <a:t>New traffic types vary in packet size, </a:t>
+            <a:endParaRPr lang="en-US" dirty="0" smtClean="0"/>
+          </a:p>
+          <a:p>
+            <a:r>
+              <a:rPr lang="en-US" dirty="0" smtClean="0"/>
+              <a:t>New </a:t>
+            </a:r>
+            <a:r>
+              <a:rPr lang="en-US" dirty="0" smtClean="0"/>
+              <a:t>traffic types vary in packet size, </a:t>
             </a:r>
             <a:r>
               <a:rPr lang="en-US" dirty="0" err="1" smtClean="0"/>
@@ -3482,7 +4945,7 @@
         <p:spPr/>
         <p:txBody>
           <a:bodyPr>
-            <a:normAutofit/>
+            <a:normAutofit fontScale="92500"/>
           </a:bodyPr>
           <a:lstStyle/>
           <a:p>
@@ -3492,7 +4955,15 @@
             </a:r>
             <a:r>
               <a:rPr lang="en-US" dirty="0" smtClean="0"/>
-              <a:t>: How does the performance of CSMA/CD vary with increasingly heterogeneous traffic?</a:t>
+              <a:t>: How does the performance of CSMA/</a:t>
+            </a:r>
+            <a:r>
+              <a:rPr lang="en-US" dirty="0" smtClean="0"/>
+              <a:t>CA </a:t>
+            </a:r>
+            <a:r>
+              <a:rPr lang="en-US" dirty="0" smtClean="0"/>
+              <a:t>vary with increasingly heterogeneous traffic?</a:t>
             </a:r>
           </a:p>
           <a:p>
@@ -3520,7 +4991,25 @@
               <a:rPr lang="en-US" dirty="0" smtClean="0"/>
               <a:t>?</a:t>
             </a:r>
-            <a:endParaRPr lang="en-US" dirty="0"/>
+          </a:p>
+          <a:p>
+            <a:r>
+              <a:rPr lang="en-US" b="1" dirty="0" smtClean="0"/>
+              <a:t>Question 3:</a:t>
+            </a:r>
+            <a:r>
+              <a:rPr lang="en-US" dirty="0" smtClean="0"/>
+              <a:t> Should </a:t>
+            </a:r>
+            <a:r>
+              <a:rPr lang="en-US" dirty="0" err="1" smtClean="0"/>
+              <a:t>backoffs</a:t>
+            </a:r>
+            <a:r>
+              <a:rPr lang="en-US" dirty="0" smtClean="0"/>
+              <a:t> be tailored to the type of traffic?</a:t>
+            </a:r>
+            <a:endParaRPr lang="en-US" b="1" dirty="0"/>
           </a:p>
         </p:txBody>
       </p:sp>
@@ -3571,7 +5060,7 @@
           <a:p>
             <a:r>
               <a:rPr lang="en-US" dirty="0" smtClean="0"/>
-              <a:t>Problem Approach</a:t>
+              <a:t>Research Approach</a:t>
             </a:r>
             <a:endParaRPr lang="en-US" dirty="0"/>
           </a:p>
@@ -3713,7 +5202,7 @@
         <p:spPr/>
         <p:txBody>
           <a:bodyPr>
-            <a:normAutofit fontScale="77500" lnSpcReduction="20000"/>
+            <a:normAutofit fontScale="85000" lnSpcReduction="10000"/>
           </a:bodyPr>
           <a:lstStyle/>
           <a:p>
@@ -3778,11 +5267,19 @@
             </a:r>
             <a:r>
               <a:rPr lang="en-US" dirty="0"/>
-              <a:t> is uniformly in the range ($0, w-1$</a:t>
-            </a:r>
-            <a:r>
-              <a:rPr lang="en-US" dirty="0" smtClean="0"/>
-              <a:t>)</a:t>
+              <a:t> is uniformly in the range </a:t>
+            </a:r>
+            <a:r>
+              <a:rPr lang="en-US" dirty="0" smtClean="0"/>
+              <a:t>(0</a:t>
+            </a:r>
+            <a:r>
+              <a:rPr lang="en-US" dirty="0"/>
+              <a:t>, w-</a:t>
+            </a:r>
+            <a:r>
+              <a:rPr lang="en-US" dirty="0" smtClean="0"/>
+              <a:t>1)</a:t>
             </a:r>
             <a:endParaRPr lang="en-US" dirty="0"/>
           </a:p>
@@ -3794,7 +5291,31 @@
             </a:r>
             <a:r>
               <a:rPr lang="en-US" dirty="0"/>
-              <a:t>window $w$ is set to $W_{min}$ to begin, and upon every failure, the </a:t>
+              <a:t>window </a:t>
+            </a:r>
+            <a:r>
+              <a:rPr lang="en-US" dirty="0" smtClean="0"/>
+              <a:t>w </a:t>
+            </a:r>
+            <a:r>
+              <a:rPr lang="en-US" dirty="0"/>
+              <a:t>is set to </a:t>
+            </a:r>
+            <a:r>
+              <a:rPr lang="en-US" dirty="0" err="1" smtClean="0"/>
+              <a:t>W</a:t>
+            </a:r>
+            <a:r>
+              <a:rPr lang="en-US" baseline="-25000" dirty="0" err="1" smtClean="0"/>
+              <a:t>min</a:t>
+            </a:r>
+            <a:r>
+              <a:rPr lang="en-US" dirty="0" smtClean="0"/>
+              <a:t> </a:t>
+            </a:r>
+            <a:r>
+              <a:rPr lang="en-US" dirty="0"/>
+              <a:t>to begin, and upon every failure, the </a:t>
             </a:r>
             <a:r>
               <a:rPr lang="en-US" dirty="0" err="1"/>
@@ -3810,19 +5331,11 @@
             <a:pPr lvl="1"/>
             <a:r>
               <a:rPr lang="en-US" dirty="0" smtClean="0"/>
-              <a:t>At </a:t>
+              <a:t>The </a:t>
             </a:r>
             <a:r>
               <a:rPr lang="en-US" dirty="0"/>
-              <a:t>stage $</a:t>
-            </a:r>
-            <a:r>
-              <a:rPr lang="en-US" dirty="0" err="1"/>
-              <a:t>i</a:t>
-            </a:r>
-            <a:r>
-              <a:rPr lang="en-US" dirty="0"/>
-              <a:t>$, the </a:t>
+              <a:t>maximum </a:t>
             </a:r>
             <a:r>
               <a:rPr lang="en-US" dirty="0" err="1"/>
@@ -3830,38 +5343,90 @@
             </a:r>
             <a:r>
               <a:rPr lang="en-US" dirty="0"/>
-              <a:t> timer is $2^iW_{min}$. </a:t>
+              <a:t> is bounded by </a:t>
+            </a:r>
+            <a:r>
+              <a:rPr lang="en-US" dirty="0" err="1" smtClean="0"/>
+              <a:t>W</a:t>
+            </a:r>
+            <a:r>
+              <a:rPr lang="en-US" baseline="-25000" dirty="0" err="1" smtClean="0"/>
+              <a:t>max</a:t>
+            </a:r>
+            <a:r>
+              <a:rPr lang="en-US" dirty="0" smtClean="0"/>
+              <a:t> </a:t>
+            </a:r>
+            <a:r>
+              <a:rPr lang="en-US" dirty="0"/>
+              <a:t>= </a:t>
+            </a:r>
+            <a:r>
+              <a:rPr lang="en-US" dirty="0" smtClean="0"/>
+              <a:t>2</a:t>
+            </a:r>
+            <a:r>
+              <a:rPr lang="en-US" baseline="30000" dirty="0" smtClean="0"/>
+              <a:t>m</a:t>
+            </a:r>
+            <a:r>
+              <a:rPr lang="en-US" dirty="0" smtClean="0"/>
+              <a:t>W</a:t>
+            </a:r>
+            <a:r>
+              <a:rPr lang="en-US" baseline="-25000" dirty="0" smtClean="0"/>
+              <a:t>min</a:t>
+            </a:r>
+            <a:r>
+              <a:rPr lang="en-US" dirty="0" smtClean="0"/>
+              <a:t>. </a:t>
             </a:r>
             <a:endParaRPr lang="en-US" dirty="0" smtClean="0"/>
           </a:p>
           <a:p>
-            <a:pPr lvl="1"/>
-            <a:r>
-              <a:rPr lang="en-US" dirty="0" smtClean="0"/>
-              <a:t>The </a:t>
+            <a:r>
+              <a:rPr lang="en-US" dirty="0" smtClean="0"/>
+              <a:t>Selections </a:t>
             </a:r>
             <a:r>
               <a:rPr lang="en-US" dirty="0"/>
-              <a:t>maximum </a:t>
+              <a:t>of </a:t>
             </a:r>
             <a:r>
               <a:rPr lang="en-US" dirty="0" err="1"/>
-              <a:t>backoff</a:t>
+              <a:t>W</a:t>
+            </a:r>
+            <a:r>
+              <a:rPr lang="en-US" baseline="-25000" dirty="0" err="1"/>
+              <a:t>min</a:t>
             </a:r>
             <a:r>
               <a:rPr lang="en-US" dirty="0"/>
-              <a:t> is bounded by $W_{max} = 2^mW_{min}$. </a:t>
-            </a:r>
-            <a:endParaRPr lang="en-US" dirty="0" smtClean="0"/>
-          </a:p>
-          <a:p>
-            <a:r>
-              <a:rPr lang="en-US" dirty="0" smtClean="0"/>
-              <a:t>Selections </a:t>
+              <a:t> </a:t>
+            </a:r>
+            <a:r>
+              <a:rPr lang="en-US" dirty="0" smtClean="0"/>
+              <a:t>and </a:t>
+            </a:r>
+            <a:r>
+              <a:rPr lang="en-US" dirty="0" err="1"/>
+              <a:t>W</a:t>
+            </a:r>
+            <a:r>
+              <a:rPr lang="en-US" baseline="-25000" dirty="0" err="1"/>
+              <a:t>max</a:t>
+            </a:r>
+            <a:r>
+              <a:rPr lang="en-US" dirty="0" err="1" smtClean="0"/>
+              <a:t>are</a:t>
+            </a:r>
+            <a:r>
+              <a:rPr lang="en-US" dirty="0" smtClean="0"/>
+              <a:t> </a:t>
             </a:r>
             <a:r>
               <a:rPr lang="en-US" dirty="0"/>
-              <a:t>of $W_{min}$ and $W_{max}$ are dependent upon the physical layer specifications in the 802.11 </a:t>
+              <a:t>dependent upon the physical layer specifications in the 802.11 </a:t>
             </a:r>
             <a:r>
               <a:rPr lang="en-US" dirty="0" smtClean="0"/>
@@ -3913,42 +5478,125 @@
         </p:nvSpPr>
         <p:spPr/>
         <p:txBody>
+          <a:bodyPr/>
+          <a:lstStyle/>
+          <a:p>
+            <a:r>
+              <a:rPr lang="en-US" dirty="0" smtClean="0"/>
+              <a:t>Traffic Models</a:t>
+            </a:r>
+            <a:endParaRPr lang="en-US" dirty="0"/>
+          </a:p>
+        </p:txBody>
+      </p:sp>
+      <p:sp>
+        <p:nvSpPr>
+          <p:cNvPr id="3" name="Content Placeholder 2"/>
+          <p:cNvSpPr>
+            <a:spLocks noGrp="1"/>
+          </p:cNvSpPr>
+          <p:nvPr>
+            <p:ph idx="1"/>
+          </p:nvPr>
+        </p:nvSpPr>
+        <p:spPr/>
+        <p:txBody>
           <a:bodyPr>
-            <a:normAutofit fontScale="90000"/>
+            <a:normAutofit fontScale="85000" lnSpcReduction="20000"/>
           </a:bodyPr>
           <a:lstStyle/>
           <a:p>
             <a:r>
               <a:rPr lang="en-US" dirty="0" smtClean="0"/>
-              <a:t>The DCF Model with Saturated Traffic</a:t>
-            </a:r>
-            <a:endParaRPr lang="en-US" dirty="0"/>
-          </a:p>
-        </p:txBody>
-      </p:sp>
-      <p:sp>
-        <p:nvSpPr>
-          <p:cNvPr id="3" name="Content Placeholder 2"/>
-          <p:cNvSpPr>
-            <a:spLocks noGrp="1"/>
-          </p:cNvSpPr>
-          <p:nvPr>
-            <p:ph idx="1"/>
-          </p:nvPr>
-        </p:nvSpPr>
-        <p:spPr/>
-        <p:txBody>
-          <a:bodyPr/>
-          <a:lstStyle/>
-          <a:p>
-            <a:endParaRPr lang="en-US" dirty="0"/>
+              <a:t>We focus on three types of traffic</a:t>
+            </a:r>
+          </a:p>
+          <a:p>
+            <a:pPr lvl="1"/>
+            <a:r>
+              <a:rPr lang="en-US" dirty="0" smtClean="0"/>
+              <a:t>Multimedia</a:t>
+            </a:r>
+          </a:p>
+          <a:p>
+            <a:pPr lvl="1"/>
+            <a:r>
+              <a:rPr lang="en-US" dirty="0" smtClean="0"/>
+              <a:t>Web browsing</a:t>
+            </a:r>
+          </a:p>
+          <a:p>
+            <a:pPr lvl="1"/>
+            <a:r>
+              <a:rPr lang="en-US" dirty="0" smtClean="0"/>
+              <a:t>File downloads</a:t>
+            </a:r>
+          </a:p>
+          <a:p>
+            <a:r>
+              <a:rPr lang="en-US" dirty="0" smtClean="0"/>
+              <a:t>Each traffic can be characterized according to</a:t>
+            </a:r>
+          </a:p>
+          <a:p>
+            <a:pPr lvl="1"/>
+            <a:r>
+              <a:rPr lang="en-US" dirty="0" smtClean="0"/>
+              <a:t>Packet size </a:t>
+            </a:r>
+          </a:p>
+          <a:p>
+            <a:pPr lvl="1"/>
+            <a:r>
+              <a:rPr lang="en-US" dirty="0" err="1" smtClean="0"/>
+              <a:t>Interarrival</a:t>
+            </a:r>
+            <a:r>
+              <a:rPr lang="en-US" dirty="0" smtClean="0"/>
+              <a:t> time and packet queue saturation</a:t>
+            </a:r>
+          </a:p>
+          <a:p>
+            <a:pPr lvl="1"/>
+            <a:r>
+              <a:rPr lang="en-US" dirty="0" smtClean="0"/>
+              <a:t>Type of packet</a:t>
+            </a:r>
+          </a:p>
+          <a:p>
+            <a:pPr marL="0" indent="0">
+              <a:buNone/>
+            </a:pPr>
+            <a:endParaRPr lang="en-US" b="1" dirty="0" smtClean="0"/>
+          </a:p>
+          <a:p>
+            <a:pPr marL="0" indent="0">
+              <a:buNone/>
+            </a:pPr>
+            <a:r>
+              <a:rPr lang="en-US" b="1" dirty="0" smtClean="0"/>
+              <a:t>Consequence: </a:t>
+            </a:r>
+            <a:r>
+              <a:rPr lang="en-US" dirty="0" smtClean="0"/>
+              <a:t>our model needs to </a:t>
+            </a:r>
+            <a:r>
+              <a:rPr lang="en-US" i="1" dirty="0" smtClean="0"/>
+              <a:t>parameterize </a:t>
+            </a:r>
+            <a:r>
+              <a:rPr lang="en-US" dirty="0" smtClean="0"/>
+              <a:t>each of these characteristics to model each type of traffic</a:t>
+            </a:r>
+            <a:endParaRPr lang="en-US" b="1" dirty="0" smtClean="0"/>
           </a:p>
         </p:txBody>
       </p:sp>
     </p:spTree>
     <p:extLst>
       <p:ext uri="{BB962C8B-B14F-4D97-AF65-F5344CB8AC3E}">
-        <p14:creationId xmlns:p14="http://schemas.microsoft.com/office/powerpoint/2010/main" val="1892940821"/>
+        <p14:creationId xmlns:p14="http://schemas.microsoft.com/office/powerpoint/2010/main" val="1566023973"/>
       </p:ext>
     </p:extLst>
   </p:cSld>
@@ -3987,40 +5635,132 @@
         </p:nvSpPr>
         <p:spPr/>
         <p:txBody>
-          <a:bodyPr/>
-          <a:lstStyle/>
-          <a:p>
-            <a:r>
-              <a:rPr lang="en-US" dirty="0" smtClean="0"/>
-              <a:t>Supporting </a:t>
-            </a:r>
-            <a:r>
-              <a:rPr lang="en-US" smtClean="0"/>
-              <a:t>Unsaturated Traffic</a:t>
-            </a:r>
-            <a:endParaRPr lang="en-US"/>
-          </a:p>
-        </p:txBody>
-      </p:sp>
-      <p:sp>
-        <p:nvSpPr>
-          <p:cNvPr id="3" name="Content Placeholder 2"/>
-          <p:cNvSpPr>
-            <a:spLocks noGrp="1"/>
-          </p:cNvSpPr>
-          <p:nvPr>
-            <p:ph idx="1"/>
-          </p:nvPr>
-        </p:nvSpPr>
-        <p:spPr/>
-        <p:txBody>
-          <a:bodyPr/>
-          <a:lstStyle/>
-          <a:p>
-            <a:endParaRPr lang="en-US"/>
-          </a:p>
-        </p:txBody>
-      </p:sp>
+          <a:bodyPr>
+            <a:normAutofit fontScale="90000"/>
+          </a:bodyPr>
+          <a:lstStyle/>
+          <a:p>
+            <a:r>
+              <a:rPr lang="en-US" dirty="0" smtClean="0"/>
+              <a:t>The DCF Model with Saturated Traffic</a:t>
+            </a:r>
+            <a:endParaRPr lang="en-US" dirty="0"/>
+          </a:p>
+        </p:txBody>
+      </p:sp>
+      <p:pic>
+        <p:nvPicPr>
+          <p:cNvPr id="5" name="Picture 4" descr="dcf_model.png"/>
+          <p:cNvPicPr>
+            <a:picLocks noChangeAspect="1"/>
+          </p:cNvPicPr>
+          <p:nvPr/>
+        </p:nvPicPr>
+        <p:blipFill>
+          <a:blip r:embed="rId2">
+            <a:extLst>
+              <a:ext uri="{28A0092B-C50C-407E-A947-70E740481C1C}">
+                <a14:useLocalDpi xmlns:a14="http://schemas.microsoft.com/office/drawing/2010/main" val="0"/>
+              </a:ext>
+            </a:extLst>
+          </a:blip>
+          <a:stretch>
+            <a:fillRect/>
+          </a:stretch>
+        </p:blipFill>
+        <p:spPr>
+          <a:xfrm>
+            <a:off x="914040" y="1417638"/>
+            <a:ext cx="7562472" cy="5217948"/>
+          </a:xfrm>
+          <a:prstGeom prst="rect">
+            <a:avLst/>
+          </a:prstGeom>
+        </p:spPr>
+      </p:pic>
+    </p:spTree>
+    <p:extLst>
+      <p:ext uri="{BB962C8B-B14F-4D97-AF65-F5344CB8AC3E}">
+        <p14:creationId xmlns:p14="http://schemas.microsoft.com/office/powerpoint/2010/main" val="1892940821"/>
+      </p:ext>
+    </p:extLst>
+  </p:cSld>
+  <p:clrMapOvr>
+    <a:masterClrMapping/>
+  </p:clrMapOvr>
+</p:sld>
+</file>
+
+<file path=ppt/slides/slide9.xml><?xml version="1.0" encoding="utf-8"?>
+<p:sld xmlns:a="http://schemas.openxmlformats.org/drawingml/2006/main" xmlns:r="http://schemas.openxmlformats.org/officeDocument/2006/relationships" xmlns:p="http://schemas.openxmlformats.org/presentationml/2006/main">
+  <p:cSld>
+    <p:spTree>
+      <p:nvGrpSpPr>
+        <p:cNvPr id="1" name=""/>
+        <p:cNvGrpSpPr/>
+        <p:nvPr/>
+      </p:nvGrpSpPr>
+      <p:grpSpPr>
+        <a:xfrm>
+          <a:off x="0" y="0"/>
+          <a:ext cx="0" cy="0"/>
+          <a:chOff x="0" y="0"/>
+          <a:chExt cx="0" cy="0"/>
+        </a:xfrm>
+      </p:grpSpPr>
+      <p:sp>
+        <p:nvSpPr>
+          <p:cNvPr id="2" name="Title 1"/>
+          <p:cNvSpPr>
+            <a:spLocks noGrp="1"/>
+          </p:cNvSpPr>
+          <p:nvPr>
+            <p:ph type="title"/>
+          </p:nvPr>
+        </p:nvSpPr>
+        <p:spPr/>
+        <p:txBody>
+          <a:bodyPr/>
+          <a:lstStyle/>
+          <a:p>
+            <a:r>
+              <a:rPr lang="en-US" dirty="0" smtClean="0"/>
+              <a:t>Supporting Unsaturated Traffic</a:t>
+            </a:r>
+            <a:endParaRPr lang="en-US" dirty="0"/>
+          </a:p>
+        </p:txBody>
+      </p:sp>
+      <p:pic>
+        <p:nvPicPr>
+          <p:cNvPr id="4" name="Picture 3" descr="dcf_model_nonsaturated.png"/>
+          <p:cNvPicPr>
+            <a:picLocks noChangeAspect="1"/>
+          </p:cNvPicPr>
+          <p:nvPr/>
+        </p:nvPicPr>
+        <p:blipFill>
+          <a:blip r:embed="rId2">
+            <a:extLst>
+              <a:ext uri="{28A0092B-C50C-407E-A947-70E740481C1C}">
+                <a14:useLocalDpi xmlns:a14="http://schemas.microsoft.com/office/drawing/2010/main" val="0"/>
+              </a:ext>
+            </a:extLst>
+          </a:blip>
+          <a:stretch>
+            <a:fillRect/>
+          </a:stretch>
+        </p:blipFill>
+        <p:spPr>
+          <a:xfrm>
+            <a:off x="1396796" y="1173870"/>
+            <a:ext cx="6079859" cy="5597532"/>
+          </a:xfrm>
+          <a:prstGeom prst="rect">
+            <a:avLst/>
+          </a:prstGeom>
+        </p:spPr>
+      </p:pic>
     </p:spTree>
     <p:extLst>
       <p:ext uri="{BB962C8B-B14F-4D97-AF65-F5344CB8AC3E}">

</xml_diff>

<commit_message>
Updating wording on 'traffic models' slide
</commit_message>
<xml_diff>
--- a/presentation/slides.pptx
+++ b/presentation/slides.pptx
@@ -14726,24 +14726,46 @@
               <a:rPr lang="en-US" dirty="0"/>
               <a:t>Packet size </a:t>
             </a:r>
+            <a:r>
+              <a:rPr lang="en-US" dirty="0" smtClean="0"/>
+              <a:t>(bytes per transmission)</a:t>
+            </a:r>
+            <a:endParaRPr lang="en-US" dirty="0"/>
           </a:p>
           <a:p>
             <a:pPr lvl="1"/>
             <a:r>
-              <a:rPr lang="en-US" dirty="0" err="1"/>
+              <a:rPr lang="en-US" dirty="0" err="1" smtClean="0"/>
               <a:t>Interarrival</a:t>
             </a:r>
             <a:r>
+              <a:rPr lang="en-US" dirty="0" smtClean="0"/>
+              <a:t> </a:t>
+            </a:r>
+            <a:r>
               <a:rPr lang="en-US" dirty="0"/>
-              <a:t> time and packet queue saturation</a:t>
+              <a:t>time </a:t>
+            </a:r>
+            <a:r>
+              <a:rPr lang="en-US" dirty="0" smtClean="0"/>
+              <a:t>(between successful transmissions)</a:t>
             </a:r>
           </a:p>
           <a:p>
             <a:pPr lvl="1"/>
             <a:r>
+              <a:rPr lang="en-US" dirty="0" smtClean="0"/>
+              <a:t>Packet </a:t>
+            </a:r>
+            <a:r>
               <a:rPr lang="en-US" dirty="0"/>
-              <a:t>Type of packet</a:t>
-            </a:r>
+              <a:t>queue </a:t>
+            </a:r>
+            <a:r>
+              <a:rPr lang="en-US" dirty="0" smtClean="0"/>
+              <a:t>saturation (buffer saturation level)</a:t>
+            </a:r>
+            <a:endParaRPr lang="en-US" dirty="0"/>
           </a:p>
           <a:p>
             <a:pPr marL="0" indent="0">
@@ -14757,11 +14779,19 @@
             </a:pPr>
             <a:r>
               <a:rPr lang="en-US" b="1" dirty="0"/>
-              <a:t>Consequence: </a:t>
+              <a:t>Consequence</a:t>
+            </a:r>
+            <a:r>
+              <a:rPr lang="en-US" b="1"/>
+              <a:t>: </a:t>
+            </a:r>
+            <a:r>
+              <a:rPr lang="en-US" smtClean="0"/>
+              <a:t>Our </a:t>
             </a:r>
             <a:r>
               <a:rPr lang="en-US" dirty="0"/>
-              <a:t>our model needs to </a:t>
+              <a:t>model needs to </a:t>
             </a:r>
             <a:r>
               <a:rPr lang="en-US" i="1" dirty="0"/>

</xml_diff>

<commit_message>
Giving diagram of simulation/black box stuff in DCF explication
</commit_message>
<xml_diff>
--- a/presentation/slides.pptx
+++ b/presentation/slides.pptx
@@ -3789,87 +3789,820 @@
             <p:ph idx="1"/>
           </p:nvPr>
         </p:nvSpPr>
-        <p:spPr/>
+        <p:spPr>
+          <a:xfrm>
+            <a:off x="457200" y="1600200"/>
+            <a:ext cx="8229600" cy="2745769"/>
+          </a:xfrm>
+        </p:spPr>
         <p:txBody>
           <a:bodyPr>
-            <a:normAutofit fontScale="92500"/>
+            <a:normAutofit/>
           </a:bodyPr>
           <a:lstStyle/>
           <a:p>
             <a:r>
-              <a:rPr lang="en-US" dirty="0" smtClean="0"/>
-              <a:t>Adding features adds new dimensions to the 2D DCF</a:t>
+              <a:rPr lang="en-US" sz="2400" dirty="0" smtClean="0"/>
+              <a:t>Adding features adds new dimensions to the 2D </a:t>
+            </a:r>
+            <a:r>
+              <a:rPr lang="en-US" sz="2400" dirty="0" smtClean="0"/>
+              <a:t>DCF</a:t>
+            </a:r>
+          </a:p>
+          <a:p>
+            <a:r>
+              <a:rPr lang="en-US" sz="2400" dirty="0" smtClean="0"/>
+              <a:t>Create </a:t>
+            </a:r>
+            <a:r>
+              <a:rPr lang="en-US" sz="2400" dirty="0" smtClean="0"/>
+              <a:t>small Markov models</a:t>
             </a:r>
           </a:p>
           <a:p>
             <a:pPr lvl="1"/>
             <a:r>
-              <a:rPr lang="en-US" dirty="0" err="1" smtClean="0"/>
-              <a:t>Packetsize</a:t>
-            </a:r>
-            <a:r>
-              <a:rPr lang="en-US" dirty="0" smtClean="0"/>
-              <a:t>, </a:t>
-            </a:r>
-            <a:r>
-              <a:rPr lang="en-US" dirty="0" err="1" smtClean="0"/>
-              <a:t>interarrival</a:t>
-            </a:r>
-            <a:r>
-              <a:rPr lang="en-US" dirty="0" smtClean="0"/>
-              <a:t>, </a:t>
-            </a:r>
-            <a:r>
-              <a:rPr lang="en-US" dirty="0" err="1" smtClean="0"/>
-              <a:t>postbackoff</a:t>
-            </a:r>
-            <a:r>
-              <a:rPr lang="en-US" dirty="0" smtClean="0"/>
-              <a:t>, etc…</a:t>
-            </a:r>
-          </a:p>
-          <a:p>
-            <a:r>
-              <a:rPr lang="en-US" dirty="0" smtClean="0"/>
-              <a:t>Create small Markov models</a:t>
+              <a:rPr lang="en-US" sz="2400" dirty="0" smtClean="0"/>
+              <a:t>Treat each as a black box</a:t>
             </a:r>
           </a:p>
           <a:p>
             <a:pPr lvl="1"/>
             <a:r>
-              <a:rPr lang="en-US" dirty="0" smtClean="0"/>
-              <a:t>Treat each as a black box</a:t>
+              <a:rPr lang="en-US" sz="2400" dirty="0" smtClean="0"/>
+              <a:t>Connect them through instantaneous transitions</a:t>
+            </a:r>
+          </a:p>
+          <a:p>
+            <a:r>
+              <a:rPr lang="en-US" sz="2400" dirty="0" smtClean="0"/>
+              <a:t>Compressible states</a:t>
             </a:r>
           </a:p>
           <a:p>
             <a:pPr lvl="1"/>
             <a:r>
-              <a:rPr lang="en-US" dirty="0" smtClean="0"/>
-              <a:t>Connect them through instantaneous transitions</a:t>
-            </a:r>
-          </a:p>
-          <a:p>
-            <a:r>
-              <a:rPr lang="en-US" dirty="0" smtClean="0"/>
-              <a:t>Compressible states</a:t>
-            </a:r>
-          </a:p>
-          <a:p>
-            <a:pPr lvl="1"/>
-            <a:r>
-              <a:rPr lang="en-US" dirty="0" smtClean="0"/>
+              <a:rPr lang="en-US" sz="2400" dirty="0" smtClean="0"/>
               <a:t>Temporary logical states</a:t>
             </a:r>
           </a:p>
           <a:p>
-            <a:pPr lvl="1"/>
-            <a:r>
-              <a:rPr lang="en-US" dirty="0" smtClean="0"/>
-              <a:t>Probabilities distributed to real states in preprocessing</a:t>
-            </a:r>
-          </a:p>
-          <a:p>
+            <a:pPr marL="0" indent="0">
+              <a:buNone/>
+            </a:pPr>
+            <a:endParaRPr lang="en-US" sz="2400" dirty="0"/>
+          </a:p>
+        </p:txBody>
+      </p:sp>
+      <p:sp>
+        <p:nvSpPr>
+          <p:cNvPr id="4" name="TextBox 3"/>
+          <p:cNvSpPr txBox="1"/>
+          <p:nvPr/>
+        </p:nvSpPr>
+        <p:spPr>
+          <a:xfrm>
+            <a:off x="667820" y="4603360"/>
+            <a:ext cx="1767156" cy="369332"/>
+          </a:xfrm>
+          <a:prstGeom prst="rect">
+            <a:avLst/>
+          </a:prstGeom>
+          <a:noFill/>
+        </p:spPr>
+        <p:txBody>
+          <a:bodyPr wrap="square" rtlCol="0">
+            <a:spAutoFit/>
+          </a:bodyPr>
+          <a:lstStyle/>
+          <a:p>
+            <a:r>
+              <a:rPr lang="en-US" dirty="0" smtClean="0"/>
+              <a:t>Markov Models</a:t>
+            </a:r>
             <a:endParaRPr lang="en-US" dirty="0"/>
+          </a:p>
+        </p:txBody>
+      </p:sp>
+      <p:sp>
+        <p:nvSpPr>
+          <p:cNvPr id="5" name="Rectangle 4"/>
+          <p:cNvSpPr/>
+          <p:nvPr/>
+        </p:nvSpPr>
+        <p:spPr>
+          <a:xfrm>
+            <a:off x="369870" y="4972692"/>
+            <a:ext cx="2614773" cy="1592495"/>
+          </a:xfrm>
+          <a:prstGeom prst="rect">
+            <a:avLst/>
+          </a:prstGeom>
+        </p:spPr>
+        <p:style>
+          <a:lnRef idx="1">
+            <a:schemeClr val="accent1"/>
+          </a:lnRef>
+          <a:fillRef idx="3">
+            <a:schemeClr val="accent1"/>
+          </a:fillRef>
+          <a:effectRef idx="2">
+            <a:schemeClr val="accent1"/>
+          </a:effectRef>
+          <a:fontRef idx="minor">
+            <a:schemeClr val="lt1"/>
+          </a:fontRef>
+        </p:style>
+        <p:txBody>
+          <a:bodyPr rtlCol="0" anchor="ctr"/>
+          <a:lstStyle/>
+          <a:p>
+            <a:pPr algn="ctr"/>
+            <a:endParaRPr lang="en-US"/>
+          </a:p>
+        </p:txBody>
+      </p:sp>
+      <p:sp>
+        <p:nvSpPr>
+          <p:cNvPr id="6" name="Oval 5"/>
+          <p:cNvSpPr/>
+          <p:nvPr/>
+        </p:nvSpPr>
+        <p:spPr>
+          <a:xfrm>
+            <a:off x="667820" y="5239820"/>
+            <a:ext cx="308225" cy="308225"/>
+          </a:xfrm>
+          <a:prstGeom prst="ellipse">
+            <a:avLst/>
+          </a:prstGeom>
+          <a:solidFill>
+            <a:srgbClr val="FF0000"/>
+          </a:solidFill>
+        </p:spPr>
+        <p:style>
+          <a:lnRef idx="1">
+            <a:schemeClr val="accent1"/>
+          </a:lnRef>
+          <a:fillRef idx="3">
+            <a:schemeClr val="accent1"/>
+          </a:fillRef>
+          <a:effectRef idx="2">
+            <a:schemeClr val="accent1"/>
+          </a:effectRef>
+          <a:fontRef idx="minor">
+            <a:schemeClr val="lt1"/>
+          </a:fontRef>
+        </p:style>
+        <p:txBody>
+          <a:bodyPr rtlCol="0" anchor="ctr"/>
+          <a:lstStyle/>
+          <a:p>
+            <a:pPr algn="ctr"/>
+            <a:endParaRPr lang="en-US"/>
+          </a:p>
+        </p:txBody>
+      </p:sp>
+      <p:sp>
+        <p:nvSpPr>
+          <p:cNvPr id="7" name="Oval 6"/>
+          <p:cNvSpPr/>
+          <p:nvPr/>
+        </p:nvSpPr>
+        <p:spPr>
+          <a:xfrm>
+            <a:off x="645559" y="5661060"/>
+            <a:ext cx="308225" cy="308225"/>
+          </a:xfrm>
+          <a:prstGeom prst="ellipse">
+            <a:avLst/>
+          </a:prstGeom>
+          <a:solidFill>
+            <a:srgbClr val="FF0000"/>
+          </a:solidFill>
+        </p:spPr>
+        <p:style>
+          <a:lnRef idx="1">
+            <a:schemeClr val="accent1"/>
+          </a:lnRef>
+          <a:fillRef idx="3">
+            <a:schemeClr val="accent1"/>
+          </a:fillRef>
+          <a:effectRef idx="2">
+            <a:schemeClr val="accent1"/>
+          </a:effectRef>
+          <a:fontRef idx="minor">
+            <a:schemeClr val="lt1"/>
+          </a:fontRef>
+        </p:style>
+        <p:txBody>
+          <a:bodyPr rtlCol="0" anchor="ctr"/>
+          <a:lstStyle/>
+          <a:p>
+            <a:pPr algn="ctr"/>
+            <a:endParaRPr lang="en-US"/>
+          </a:p>
+        </p:txBody>
+      </p:sp>
+      <p:sp>
+        <p:nvSpPr>
+          <p:cNvPr id="8" name="Oval 7"/>
+          <p:cNvSpPr/>
+          <p:nvPr/>
+        </p:nvSpPr>
+        <p:spPr>
+          <a:xfrm>
+            <a:off x="1128445" y="5690171"/>
+            <a:ext cx="308225" cy="308225"/>
+          </a:xfrm>
+          <a:prstGeom prst="ellipse">
+            <a:avLst/>
+          </a:prstGeom>
+          <a:solidFill>
+            <a:srgbClr val="FF0000"/>
+          </a:solidFill>
+        </p:spPr>
+        <p:style>
+          <a:lnRef idx="1">
+            <a:schemeClr val="accent1"/>
+          </a:lnRef>
+          <a:fillRef idx="3">
+            <a:schemeClr val="accent1"/>
+          </a:fillRef>
+          <a:effectRef idx="2">
+            <a:schemeClr val="accent1"/>
+          </a:effectRef>
+          <a:fontRef idx="minor">
+            <a:schemeClr val="lt1"/>
+          </a:fontRef>
+        </p:style>
+        <p:txBody>
+          <a:bodyPr rtlCol="0" anchor="ctr"/>
+          <a:lstStyle/>
+          <a:p>
+            <a:pPr algn="ctr"/>
+            <a:endParaRPr lang="en-US"/>
+          </a:p>
+        </p:txBody>
+      </p:sp>
+      <p:sp>
+        <p:nvSpPr>
+          <p:cNvPr id="9" name="Oval 8"/>
+          <p:cNvSpPr/>
+          <p:nvPr/>
+        </p:nvSpPr>
+        <p:spPr>
+          <a:xfrm>
+            <a:off x="1611331" y="5690170"/>
+            <a:ext cx="308225" cy="308225"/>
+          </a:xfrm>
+          <a:prstGeom prst="ellipse">
+            <a:avLst/>
+          </a:prstGeom>
+          <a:solidFill>
+            <a:srgbClr val="FF0000"/>
+          </a:solidFill>
+        </p:spPr>
+        <p:style>
+          <a:lnRef idx="1">
+            <a:schemeClr val="accent1"/>
+          </a:lnRef>
+          <a:fillRef idx="3">
+            <a:schemeClr val="accent1"/>
+          </a:fillRef>
+          <a:effectRef idx="2">
+            <a:schemeClr val="accent1"/>
+          </a:effectRef>
+          <a:fontRef idx="minor">
+            <a:schemeClr val="lt1"/>
+          </a:fontRef>
+        </p:style>
+        <p:txBody>
+          <a:bodyPr rtlCol="0" anchor="ctr"/>
+          <a:lstStyle/>
+          <a:p>
+            <a:pPr algn="ctr"/>
+            <a:endParaRPr lang="en-US"/>
+          </a:p>
+        </p:txBody>
+      </p:sp>
+      <p:sp>
+        <p:nvSpPr>
+          <p:cNvPr id="10" name="Isosceles Triangle 9"/>
+          <p:cNvSpPr/>
+          <p:nvPr/>
+        </p:nvSpPr>
+        <p:spPr>
+          <a:xfrm>
+            <a:off x="2195245" y="5239820"/>
+            <a:ext cx="455488" cy="359595"/>
+          </a:xfrm>
+          <a:prstGeom prst="triangle">
+            <a:avLst/>
+          </a:prstGeom>
+          <a:solidFill>
+            <a:srgbClr val="92D050"/>
+          </a:solidFill>
+        </p:spPr>
+        <p:style>
+          <a:lnRef idx="1">
+            <a:schemeClr val="accent1"/>
+          </a:lnRef>
+          <a:fillRef idx="3">
+            <a:schemeClr val="accent1"/>
+          </a:fillRef>
+          <a:effectRef idx="2">
+            <a:schemeClr val="accent1"/>
+          </a:effectRef>
+          <a:fontRef idx="minor">
+            <a:schemeClr val="lt1"/>
+          </a:fontRef>
+        </p:style>
+        <p:txBody>
+          <a:bodyPr rtlCol="0" anchor="ctr"/>
+          <a:lstStyle/>
+          <a:p>
+            <a:pPr algn="ctr"/>
+            <a:endParaRPr lang="en-US"/>
+          </a:p>
+        </p:txBody>
+      </p:sp>
+      <p:sp>
+        <p:nvSpPr>
+          <p:cNvPr id="11" name="Isosceles Triangle 10"/>
+          <p:cNvSpPr/>
+          <p:nvPr/>
+        </p:nvSpPr>
+        <p:spPr>
+          <a:xfrm>
+            <a:off x="2195245" y="5902503"/>
+            <a:ext cx="455488" cy="359595"/>
+          </a:xfrm>
+          <a:prstGeom prst="triangle">
+            <a:avLst/>
+          </a:prstGeom>
+          <a:solidFill>
+            <a:srgbClr val="7030A0"/>
+          </a:solidFill>
+        </p:spPr>
+        <p:style>
+          <a:lnRef idx="1">
+            <a:schemeClr val="accent1"/>
+          </a:lnRef>
+          <a:fillRef idx="3">
+            <a:schemeClr val="accent1"/>
+          </a:fillRef>
+          <a:effectRef idx="2">
+            <a:schemeClr val="accent1"/>
+          </a:effectRef>
+          <a:fontRef idx="minor">
+            <a:schemeClr val="lt1"/>
+          </a:fontRef>
+        </p:style>
+        <p:txBody>
+          <a:bodyPr rtlCol="0" anchor="ctr"/>
+          <a:lstStyle/>
+          <a:p>
+            <a:pPr algn="ctr"/>
+            <a:endParaRPr lang="en-US"/>
+          </a:p>
+        </p:txBody>
+      </p:sp>
+      <p:sp>
+        <p:nvSpPr>
+          <p:cNvPr id="12" name="Rectangle 11"/>
+          <p:cNvSpPr/>
+          <p:nvPr/>
+        </p:nvSpPr>
+        <p:spPr>
+          <a:xfrm>
+            <a:off x="4078840" y="4972692"/>
+            <a:ext cx="1510302" cy="871590"/>
+          </a:xfrm>
+          <a:prstGeom prst="rect">
+            <a:avLst/>
+          </a:prstGeom>
+          <a:noFill/>
+        </p:spPr>
+        <p:style>
+          <a:lnRef idx="1">
+            <a:schemeClr val="accent1"/>
+          </a:lnRef>
+          <a:fillRef idx="3">
+            <a:schemeClr val="accent1"/>
+          </a:fillRef>
+          <a:effectRef idx="2">
+            <a:schemeClr val="accent1"/>
+          </a:effectRef>
+          <a:fontRef idx="minor">
+            <a:schemeClr val="lt1"/>
+          </a:fontRef>
+        </p:style>
+        <p:txBody>
+          <a:bodyPr rtlCol="0" anchor="ctr"/>
+          <a:lstStyle/>
+          <a:p>
+            <a:pPr algn="ctr"/>
+            <a:endParaRPr lang="en-US"/>
+          </a:p>
+        </p:txBody>
+      </p:sp>
+      <p:cxnSp>
+        <p:nvCxnSpPr>
+          <p:cNvPr id="14" name="Straight Connector 13"/>
+          <p:cNvCxnSpPr>
+            <a:stCxn id="12" idx="0"/>
+            <a:endCxn id="12" idx="2"/>
+          </p:cNvCxnSpPr>
+          <p:nvPr/>
+        </p:nvCxnSpPr>
+        <p:spPr>
+          <a:xfrm>
+            <a:off x="4833991" y="4972692"/>
+            <a:ext cx="0" cy="871590"/>
+          </a:xfrm>
+          <a:prstGeom prst="line">
+            <a:avLst/>
+          </a:prstGeom>
+        </p:spPr>
+        <p:style>
+          <a:lnRef idx="2">
+            <a:schemeClr val="accent1"/>
+          </a:lnRef>
+          <a:fillRef idx="0">
+            <a:schemeClr val="accent1"/>
+          </a:fillRef>
+          <a:effectRef idx="1">
+            <a:schemeClr val="accent1"/>
+          </a:effectRef>
+          <a:fontRef idx="minor">
+            <a:schemeClr val="tx1"/>
+          </a:fontRef>
+        </p:style>
+      </p:cxnSp>
+      <p:cxnSp>
+        <p:nvCxnSpPr>
+          <p:cNvPr id="16" name="Straight Connector 15"/>
+          <p:cNvCxnSpPr>
+            <a:stCxn id="12" idx="1"/>
+            <a:endCxn id="12" idx="3"/>
+          </p:cNvCxnSpPr>
+          <p:nvPr/>
+        </p:nvCxnSpPr>
+        <p:spPr>
+          <a:xfrm>
+            <a:off x="4078840" y="5408487"/>
+            <a:ext cx="1510302" cy="0"/>
+          </a:xfrm>
+          <a:prstGeom prst="line">
+            <a:avLst/>
+          </a:prstGeom>
+        </p:spPr>
+        <p:style>
+          <a:lnRef idx="2">
+            <a:schemeClr val="accent1"/>
+          </a:lnRef>
+          <a:fillRef idx="0">
+            <a:schemeClr val="accent1"/>
+          </a:fillRef>
+          <a:effectRef idx="1">
+            <a:schemeClr val="accent1"/>
+          </a:effectRef>
+          <a:fontRef idx="minor">
+            <a:schemeClr val="tx1"/>
+          </a:fontRef>
+        </p:style>
+      </p:cxnSp>
+      <p:cxnSp>
+        <p:nvCxnSpPr>
+          <p:cNvPr id="18" name="Straight Connector 17"/>
+          <p:cNvCxnSpPr/>
+          <p:nvPr/>
+        </p:nvCxnSpPr>
+        <p:spPr>
+          <a:xfrm>
+            <a:off x="4407613" y="4972692"/>
+            <a:ext cx="0" cy="871590"/>
+          </a:xfrm>
+          <a:prstGeom prst="line">
+            <a:avLst/>
+          </a:prstGeom>
+        </p:spPr>
+        <p:style>
+          <a:lnRef idx="2">
+            <a:schemeClr val="accent1"/>
+          </a:lnRef>
+          <a:fillRef idx="0">
+            <a:schemeClr val="accent1"/>
+          </a:fillRef>
+          <a:effectRef idx="1">
+            <a:schemeClr val="accent1"/>
+          </a:effectRef>
+          <a:fontRef idx="minor">
+            <a:schemeClr val="tx1"/>
+          </a:fontRef>
+        </p:style>
+      </p:cxnSp>
+      <p:cxnSp>
+        <p:nvCxnSpPr>
+          <p:cNvPr id="20" name="Straight Connector 19"/>
+          <p:cNvCxnSpPr/>
+          <p:nvPr/>
+        </p:nvCxnSpPr>
+        <p:spPr>
+          <a:xfrm>
+            <a:off x="5219272" y="4972692"/>
+            <a:ext cx="0" cy="871590"/>
+          </a:xfrm>
+          <a:prstGeom prst="line">
+            <a:avLst/>
+          </a:prstGeom>
+        </p:spPr>
+        <p:style>
+          <a:lnRef idx="2">
+            <a:schemeClr val="accent1"/>
+          </a:lnRef>
+          <a:fillRef idx="0">
+            <a:schemeClr val="accent1"/>
+          </a:fillRef>
+          <a:effectRef idx="1">
+            <a:schemeClr val="accent1"/>
+          </a:effectRef>
+          <a:fontRef idx="minor">
+            <a:schemeClr val="tx1"/>
+          </a:fontRef>
+        </p:style>
+      </p:cxnSp>
+      <p:cxnSp>
+        <p:nvCxnSpPr>
+          <p:cNvPr id="22" name="Straight Connector 21"/>
+          <p:cNvCxnSpPr/>
+          <p:nvPr/>
+        </p:nvCxnSpPr>
+        <p:spPr>
+          <a:xfrm>
+            <a:off x="4078840" y="5123378"/>
+            <a:ext cx="1510302" cy="0"/>
+          </a:xfrm>
+          <a:prstGeom prst="line">
+            <a:avLst/>
+          </a:prstGeom>
+        </p:spPr>
+        <p:style>
+          <a:lnRef idx="2">
+            <a:schemeClr val="accent1"/>
+          </a:lnRef>
+          <a:fillRef idx="0">
+            <a:schemeClr val="accent1"/>
+          </a:fillRef>
+          <a:effectRef idx="1">
+            <a:schemeClr val="accent1"/>
+          </a:effectRef>
+          <a:fontRef idx="minor">
+            <a:schemeClr val="tx1"/>
+          </a:fontRef>
+        </p:style>
+      </p:cxnSp>
+      <p:cxnSp>
+        <p:nvCxnSpPr>
+          <p:cNvPr id="24" name="Straight Connector 23"/>
+          <p:cNvCxnSpPr/>
+          <p:nvPr/>
+        </p:nvCxnSpPr>
+        <p:spPr>
+          <a:xfrm>
+            <a:off x="4078840" y="5661060"/>
+            <a:ext cx="1510302" cy="0"/>
+          </a:xfrm>
+          <a:prstGeom prst="line">
+            <a:avLst/>
+          </a:prstGeom>
+        </p:spPr>
+        <p:style>
+          <a:lnRef idx="2">
+            <a:schemeClr val="accent1"/>
+          </a:lnRef>
+          <a:fillRef idx="0">
+            <a:schemeClr val="accent1"/>
+          </a:fillRef>
+          <a:effectRef idx="1">
+            <a:schemeClr val="accent1"/>
+          </a:effectRef>
+          <a:fontRef idx="minor">
+            <a:schemeClr val="tx1"/>
+          </a:fontRef>
+        </p:style>
+      </p:cxnSp>
+      <p:sp>
+        <p:nvSpPr>
+          <p:cNvPr id="25" name="TextBox 24"/>
+          <p:cNvSpPr txBox="1"/>
+          <p:nvPr/>
+        </p:nvSpPr>
+        <p:spPr>
+          <a:xfrm>
+            <a:off x="4027469" y="4603360"/>
+            <a:ext cx="1880171" cy="369332"/>
+          </a:xfrm>
+          <a:prstGeom prst="rect">
+            <a:avLst/>
+          </a:prstGeom>
+          <a:noFill/>
+        </p:spPr>
+        <p:txBody>
+          <a:bodyPr wrap="square" rtlCol="0">
+            <a:spAutoFit/>
+          </a:bodyPr>
+          <a:lstStyle/>
+          <a:p>
+            <a:r>
+              <a:rPr lang="en-US" dirty="0" smtClean="0"/>
+              <a:t>Transition Matrix</a:t>
+            </a:r>
+            <a:endParaRPr lang="en-US" dirty="0"/>
+          </a:p>
+        </p:txBody>
+      </p:sp>
+      <p:sp>
+        <p:nvSpPr>
+          <p:cNvPr id="26" name="Cube 25"/>
+          <p:cNvSpPr/>
+          <p:nvPr/>
+        </p:nvSpPr>
+        <p:spPr>
+          <a:xfrm>
+            <a:off x="6575461" y="4972692"/>
+            <a:ext cx="1150705" cy="1109608"/>
+          </a:xfrm>
+          <a:prstGeom prst="cube">
+            <a:avLst/>
+          </a:prstGeom>
+        </p:spPr>
+        <p:style>
+          <a:lnRef idx="1">
+            <a:schemeClr val="accent1"/>
+          </a:lnRef>
+          <a:fillRef idx="3">
+            <a:schemeClr val="accent1"/>
+          </a:fillRef>
+          <a:effectRef idx="2">
+            <a:schemeClr val="accent1"/>
+          </a:effectRef>
+          <a:fontRef idx="minor">
+            <a:schemeClr val="lt1"/>
+          </a:fontRef>
+        </p:style>
+        <p:txBody>
+          <a:bodyPr rtlCol="0" anchor="ctr"/>
+          <a:lstStyle/>
+          <a:p>
+            <a:pPr algn="ctr"/>
+            <a:endParaRPr lang="en-US"/>
+          </a:p>
+        </p:txBody>
+      </p:sp>
+      <p:sp>
+        <p:nvSpPr>
+          <p:cNvPr id="27" name="TextBox 26"/>
+          <p:cNvSpPr txBox="1"/>
+          <p:nvPr/>
+        </p:nvSpPr>
+        <p:spPr>
+          <a:xfrm>
+            <a:off x="6667927" y="4518257"/>
+            <a:ext cx="1191800" cy="369332"/>
+          </a:xfrm>
+          <a:prstGeom prst="rect">
+            <a:avLst/>
+          </a:prstGeom>
+          <a:noFill/>
+        </p:spPr>
+        <p:txBody>
+          <a:bodyPr wrap="square" rtlCol="0">
+            <a:spAutoFit/>
+          </a:bodyPr>
+          <a:lstStyle/>
+          <a:p>
+            <a:r>
+              <a:rPr lang="en-US" dirty="0" smtClean="0"/>
+              <a:t>Simulator</a:t>
+            </a:r>
+            <a:endParaRPr lang="en-US" dirty="0"/>
+          </a:p>
+        </p:txBody>
+      </p:sp>
+      <p:sp>
+        <p:nvSpPr>
+          <p:cNvPr id="28" name="Right Arrow 27"/>
+          <p:cNvSpPr/>
+          <p:nvPr/>
+        </p:nvSpPr>
+        <p:spPr>
+          <a:xfrm>
+            <a:off x="3411020" y="5239820"/>
+            <a:ext cx="534256" cy="179797"/>
+          </a:xfrm>
+          <a:prstGeom prst="rightArrow">
+            <a:avLst/>
+          </a:prstGeom>
+        </p:spPr>
+        <p:style>
+          <a:lnRef idx="1">
+            <a:schemeClr val="accent1"/>
+          </a:lnRef>
+          <a:fillRef idx="3">
+            <a:schemeClr val="accent1"/>
+          </a:fillRef>
+          <a:effectRef idx="2">
+            <a:schemeClr val="accent1"/>
+          </a:effectRef>
+          <a:fontRef idx="minor">
+            <a:schemeClr val="lt1"/>
+          </a:fontRef>
+        </p:style>
+        <p:txBody>
+          <a:bodyPr rtlCol="0" anchor="ctr"/>
+          <a:lstStyle/>
+          <a:p>
+            <a:pPr algn="ctr"/>
+            <a:endParaRPr lang="en-US"/>
+          </a:p>
+        </p:txBody>
+      </p:sp>
+      <p:sp>
+        <p:nvSpPr>
+          <p:cNvPr id="29" name="Right Arrow 28"/>
+          <p:cNvSpPr/>
+          <p:nvPr/>
+        </p:nvSpPr>
+        <p:spPr>
+          <a:xfrm>
+            <a:off x="5815173" y="5239820"/>
+            <a:ext cx="534256" cy="179797"/>
+          </a:xfrm>
+          <a:prstGeom prst="rightArrow">
+            <a:avLst/>
+          </a:prstGeom>
+        </p:spPr>
+        <p:style>
+          <a:lnRef idx="1">
+            <a:schemeClr val="accent1"/>
+          </a:lnRef>
+          <a:fillRef idx="3">
+            <a:schemeClr val="accent1"/>
+          </a:fillRef>
+          <a:effectRef idx="2">
+            <a:schemeClr val="accent1"/>
+          </a:effectRef>
+          <a:fontRef idx="minor">
+            <a:schemeClr val="lt1"/>
+          </a:fontRef>
+        </p:style>
+        <p:txBody>
+          <a:bodyPr rtlCol="0" anchor="ctr"/>
+          <a:lstStyle/>
+          <a:p>
+            <a:pPr algn="ctr"/>
+            <a:endParaRPr lang="en-US"/>
+          </a:p>
+        </p:txBody>
+      </p:sp>
+      <p:sp>
+        <p:nvSpPr>
+          <p:cNvPr id="30" name="Right Arrow 29"/>
+          <p:cNvSpPr/>
+          <p:nvPr/>
+        </p:nvSpPr>
+        <p:spPr>
+          <a:xfrm>
+            <a:off x="7995864" y="5239819"/>
+            <a:ext cx="534256" cy="179797"/>
+          </a:xfrm>
+          <a:prstGeom prst="rightArrow">
+            <a:avLst/>
+          </a:prstGeom>
+        </p:spPr>
+        <p:style>
+          <a:lnRef idx="1">
+            <a:schemeClr val="accent1"/>
+          </a:lnRef>
+          <a:fillRef idx="3">
+            <a:schemeClr val="accent1"/>
+          </a:fillRef>
+          <a:effectRef idx="2">
+            <a:schemeClr val="accent1"/>
+          </a:effectRef>
+          <a:fontRef idx="minor">
+            <a:schemeClr val="lt1"/>
+          </a:fontRef>
+        </p:style>
+        <p:txBody>
+          <a:bodyPr rtlCol="0" anchor="ctr"/>
+          <a:lstStyle/>
+          <a:p>
+            <a:pPr algn="ctr"/>
+            <a:endParaRPr lang="en-US"/>
           </a:p>
         </p:txBody>
       </p:sp>
@@ -14779,14 +15512,10 @@
             </a:pPr>
             <a:r>
               <a:rPr lang="en-US" b="1" dirty="0"/>
-              <a:t>Consequence</a:t>
-            </a:r>
-            <a:r>
-              <a:rPr lang="en-US" b="1"/>
-              <a:t>: </a:t>
-            </a:r>
-            <a:r>
-              <a:rPr lang="en-US" smtClean="0"/>
+              <a:t>Consequence: </a:t>
+            </a:r>
+            <a:r>
+              <a:rPr lang="en-US" dirty="0" smtClean="0"/>
               <a:t>Our </a:t>
             </a:r>
             <a:r>

</xml_diff>

<commit_message>
Pushing final slide deck
</commit_message>
<xml_diff>
--- a/presentation/slides.pptx
+++ b/presentation/slides.pptx
@@ -5,7 +5,7 @@
     <p:sldMasterId id="2147483648" r:id="rId1"/>
   </p:sldMasterIdLst>
   <p:notesMasterIdLst>
-    <p:notesMasterId r:id="rId42"/>
+    <p:notesMasterId r:id="rId41"/>
   </p:notesMasterIdLst>
   <p:sldIdLst>
     <p:sldId id="256" r:id="rId2"/>
@@ -39,15 +39,14 @@
     <p:sldId id="277" r:id="rId30"/>
     <p:sldId id="279" r:id="rId31"/>
     <p:sldId id="282" r:id="rId32"/>
-    <p:sldId id="280" r:id="rId33"/>
-    <p:sldId id="281" r:id="rId34"/>
-    <p:sldId id="288" r:id="rId35"/>
-    <p:sldId id="283" r:id="rId36"/>
-    <p:sldId id="289" r:id="rId37"/>
-    <p:sldId id="285" r:id="rId38"/>
-    <p:sldId id="290" r:id="rId39"/>
-    <p:sldId id="287" r:id="rId40"/>
-    <p:sldId id="291" r:id="rId41"/>
+    <p:sldId id="281" r:id="rId33"/>
+    <p:sldId id="288" r:id="rId34"/>
+    <p:sldId id="283" r:id="rId35"/>
+    <p:sldId id="289" r:id="rId36"/>
+    <p:sldId id="285" r:id="rId37"/>
+    <p:sldId id="290" r:id="rId38"/>
+    <p:sldId id="287" r:id="rId39"/>
+    <p:sldId id="291" r:id="rId40"/>
   </p:sldIdLst>
   <p:sldSz cx="9144000" cy="6858000" type="screen4x3"/>
   <p:notesSz cx="6858000" cy="9144000"/>
@@ -148,7 +147,7 @@
   </p:defaultTextStyle>
   <p:extLst>
     <p:ext uri="{EFAFB233-063F-42B5-8137-9DF3F51BA10A}">
-      <p15:sldGuideLst xmlns:p15="http://schemas.microsoft.com/office/powerpoint/2012/main">
+      <p15:sldGuideLst xmlns:p15="http://schemas.microsoft.com/office/powerpoint/2012/main" xmlns="">
         <p15:guide id="1" orient="horz" pos="2160">
           <p15:clr>
             <a:srgbClr val="A4A3A4"/>
@@ -247,7 +246,7 @@
           <a:p>
             <a:fld id="{81A0CA93-770D-5346-B8C8-0E7C9C8E8EDB}" type="datetimeFigureOut">
               <a:rPr lang="en-US" smtClean="0"/>
-              <a:t>3/10/2015</a:t>
+              <a:t>3/10/15</a:t>
             </a:fld>
             <a:endParaRPr lang="en-US"/>
           </a:p>
@@ -780,7 +779,7 @@
           <a:p>
             <a:fld id="{439BD6C3-830F-9543-8A1D-F37F17474F11}" type="datetimeFigureOut">
               <a:rPr lang="en-US" smtClean="0"/>
-              <a:t>3/10/2015</a:t>
+              <a:t>3/10/15</a:t>
             </a:fld>
             <a:endParaRPr lang="en-US"/>
           </a:p>
@@ -950,7 +949,7 @@
           <a:p>
             <a:fld id="{439BD6C3-830F-9543-8A1D-F37F17474F11}" type="datetimeFigureOut">
               <a:rPr lang="en-US" smtClean="0"/>
-              <a:t>3/10/2015</a:t>
+              <a:t>3/10/15</a:t>
             </a:fld>
             <a:endParaRPr lang="en-US"/>
           </a:p>
@@ -1130,7 +1129,7 @@
           <a:p>
             <a:fld id="{439BD6C3-830F-9543-8A1D-F37F17474F11}" type="datetimeFigureOut">
               <a:rPr lang="en-US" smtClean="0"/>
-              <a:t>3/10/2015</a:t>
+              <a:t>3/10/15</a:t>
             </a:fld>
             <a:endParaRPr lang="en-US"/>
           </a:p>
@@ -1300,7 +1299,7 @@
           <a:p>
             <a:fld id="{439BD6C3-830F-9543-8A1D-F37F17474F11}" type="datetimeFigureOut">
               <a:rPr lang="en-US" smtClean="0"/>
-              <a:t>3/10/2015</a:t>
+              <a:t>3/10/15</a:t>
             </a:fld>
             <a:endParaRPr lang="en-US"/>
           </a:p>
@@ -1546,7 +1545,7 @@
           <a:p>
             <a:fld id="{439BD6C3-830F-9543-8A1D-F37F17474F11}" type="datetimeFigureOut">
               <a:rPr lang="en-US" smtClean="0"/>
-              <a:t>3/10/2015</a:t>
+              <a:t>3/10/15</a:t>
             </a:fld>
             <a:endParaRPr lang="en-US"/>
           </a:p>
@@ -1834,7 +1833,7 @@
           <a:p>
             <a:fld id="{439BD6C3-830F-9543-8A1D-F37F17474F11}" type="datetimeFigureOut">
               <a:rPr lang="en-US" smtClean="0"/>
-              <a:t>3/10/2015</a:t>
+              <a:t>3/10/15</a:t>
             </a:fld>
             <a:endParaRPr lang="en-US"/>
           </a:p>
@@ -2256,7 +2255,7 @@
           <a:p>
             <a:fld id="{439BD6C3-830F-9543-8A1D-F37F17474F11}" type="datetimeFigureOut">
               <a:rPr lang="en-US" smtClean="0"/>
-              <a:t>3/10/2015</a:t>
+              <a:t>3/10/15</a:t>
             </a:fld>
             <a:endParaRPr lang="en-US"/>
           </a:p>
@@ -2374,7 +2373,7 @@
           <a:p>
             <a:fld id="{439BD6C3-830F-9543-8A1D-F37F17474F11}" type="datetimeFigureOut">
               <a:rPr lang="en-US" smtClean="0"/>
-              <a:t>3/10/2015</a:t>
+              <a:t>3/10/15</a:t>
             </a:fld>
             <a:endParaRPr lang="en-US"/>
           </a:p>
@@ -2469,7 +2468,7 @@
           <a:p>
             <a:fld id="{439BD6C3-830F-9543-8A1D-F37F17474F11}" type="datetimeFigureOut">
               <a:rPr lang="en-US" smtClean="0"/>
-              <a:t>3/10/2015</a:t>
+              <a:t>3/10/15</a:t>
             </a:fld>
             <a:endParaRPr lang="en-US"/>
           </a:p>
@@ -2746,7 +2745,7 @@
           <a:p>
             <a:fld id="{439BD6C3-830F-9543-8A1D-F37F17474F11}" type="datetimeFigureOut">
               <a:rPr lang="en-US" smtClean="0"/>
-              <a:t>3/10/2015</a:t>
+              <a:t>3/10/15</a:t>
             </a:fld>
             <a:endParaRPr lang="en-US"/>
           </a:p>
@@ -2999,7 +2998,7 @@
           <a:p>
             <a:fld id="{439BD6C3-830F-9543-8A1D-F37F17474F11}" type="datetimeFigureOut">
               <a:rPr lang="en-US" smtClean="0"/>
-              <a:t>3/10/2015</a:t>
+              <a:t>3/10/15</a:t>
             </a:fld>
             <a:endParaRPr lang="en-US"/>
           </a:p>
@@ -3212,7 +3211,7 @@
           <a:p>
             <a:fld id="{439BD6C3-830F-9543-8A1D-F37F17474F11}" type="datetimeFigureOut">
               <a:rPr lang="en-US" smtClean="0"/>
-              <a:t>3/10/2015</a:t>
+              <a:t>3/10/15</a:t>
             </a:fld>
             <a:endParaRPr lang="en-US"/>
           </a:p>
@@ -3803,21 +3802,13 @@
           <a:p>
             <a:r>
               <a:rPr lang="en-US" sz="2400" dirty="0" smtClean="0"/>
-              <a:t>Adding features adds new dimensions to the 2D </a:t>
-            </a:r>
+              <a:t>Adding features adds new dimensions to the 2D DCF</a:t>
+            </a:r>
+          </a:p>
+          <a:p>
             <a:r>
               <a:rPr lang="en-US" sz="2400" dirty="0" smtClean="0"/>
-              <a:t>DCF</a:t>
-            </a:r>
-          </a:p>
-          <a:p>
-            <a:r>
-              <a:rPr lang="en-US" sz="2400" dirty="0" smtClean="0"/>
-              <a:t>Create </a:t>
-            </a:r>
-            <a:r>
-              <a:rPr lang="en-US" sz="2400" dirty="0" smtClean="0"/>
-              <a:t>small Markov models</a:t>
+              <a:t>Create small Markov models</a:t>
             </a:r>
           </a:p>
           <a:p>
@@ -4619,7 +4610,7 @@
   <p:timing>
     <p:tnLst>
       <p:par>
-        <p:cTn id="1" dur="indefinite" restart="never" nodeType="tmRoot"/>
+        <p:cTn xmlns:p14="http://schemas.microsoft.com/office/powerpoint/2010/main" id="1" dur="indefinite" restart="never" nodeType="tmRoot"/>
       </p:par>
     </p:tnLst>
   </p:timing>
@@ -5475,7 +5466,7 @@
   <p:timing>
     <p:tnLst>
       <p:par>
-        <p:cTn id="1" dur="indefinite" restart="never" nodeType="tmRoot"/>
+        <p:cTn xmlns:p14="http://schemas.microsoft.com/office/powerpoint/2010/main" id="1" dur="indefinite" restart="never" nodeType="tmRoot"/>
       </p:par>
     </p:tnLst>
   </p:timing>
@@ -6672,7 +6663,7 @@
   <p:timing>
     <p:tnLst>
       <p:par>
-        <p:cTn id="1" dur="indefinite" restart="never" nodeType="tmRoot"/>
+        <p:cTn xmlns:p14="http://schemas.microsoft.com/office/powerpoint/2010/main" id="1" dur="indefinite" restart="never" nodeType="tmRoot"/>
       </p:par>
     </p:tnLst>
   </p:timing>
@@ -6777,13 +6768,8 @@
             </a:pPr>
             <a:r>
               <a:rPr lang="en-US" sz="1600" dirty="0" smtClean="0"/>
-              <a:t>Green: Compressible </a:t>
-            </a:r>
-            <a:r>
-              <a:rPr lang="en-US" sz="1600" dirty="0" smtClean="0"/>
-              <a:t>states</a:t>
-            </a:r>
-            <a:endParaRPr lang="en-US" sz="1600" dirty="0" smtClean="0"/>
+              <a:t>Green: Compressible states</a:t>
+            </a:r>
           </a:p>
         </p:txBody>
       </p:sp>
@@ -8063,7 +8049,7 @@
   <p:timing>
     <p:tnLst>
       <p:par>
-        <p:cTn id="1" dur="indefinite" restart="never" nodeType="tmRoot"/>
+        <p:cTn xmlns:p14="http://schemas.microsoft.com/office/powerpoint/2010/main" id="1" dur="indefinite" restart="never" nodeType="tmRoot"/>
       </p:par>
     </p:tnLst>
   </p:timing>
@@ -9912,7 +9898,7 @@
   <p:timing>
     <p:tnLst>
       <p:par>
-        <p:cTn id="1" dur="indefinite" restart="never" nodeType="tmRoot"/>
+        <p:cTn xmlns:p14="http://schemas.microsoft.com/office/powerpoint/2010/main" id="1" dur="indefinite" restart="never" nodeType="tmRoot"/>
       </p:par>
     </p:tnLst>
   </p:timing>
@@ -9963,22 +9949,14 @@
             </a:r>
             <a:r>
               <a:rPr lang="en-US" dirty="0" smtClean="0"/>
-              <a:t> </a:t>
-            </a:r>
-            <a:r>
-              <a:rPr lang="en-US" dirty="0" smtClean="0"/>
-              <a:t>Chains</a:t>
+              <a:t> Chains</a:t>
             </a:r>
             <a:br>
               <a:rPr lang="en-US" dirty="0" smtClean="0"/>
             </a:br>
             <a:r>
               <a:rPr lang="en-US" dirty="0" smtClean="0"/>
-              <a:t>(a </a:t>
-            </a:r>
-            <a:r>
-              <a:rPr lang="en-US" dirty="0" smtClean="0"/>
-              <a:t>new dimension)</a:t>
+              <a:t>(a new dimension)</a:t>
             </a:r>
             <a:endParaRPr lang="en-US" dirty="0"/>
           </a:p>
@@ -15140,7 +15118,7 @@
   <p:timing>
     <p:tnLst>
       <p:par>
-        <p:cTn id="1" dur="indefinite" restart="never" nodeType="tmRoot"/>
+        <p:cTn xmlns:p14="http://schemas.microsoft.com/office/powerpoint/2010/main" id="1" dur="indefinite" restart="never" nodeType="tmRoot"/>
       </p:par>
     </p:tnLst>
   </p:timing>
@@ -15305,21 +15283,12 @@
               <a:rPr lang="en-US" sz="2400" dirty="0" smtClean="0"/>
               <a:t>Web traffic may download a small HTML file followed by many large images.</a:t>
             </a:r>
-            <a:endParaRPr lang="en-US" sz="2400" dirty="0" smtClean="0"/>
           </a:p>
           <a:p>
             <a:pPr lvl="1"/>
             <a:r>
               <a:rPr lang="en-US" sz="2400" dirty="0" smtClean="0"/>
-              <a:t>Each </a:t>
-            </a:r>
-            <a:r>
-              <a:rPr lang="en-US" sz="2400" dirty="0" smtClean="0"/>
-              <a:t>packet type has a “fixed” packet size, decided at the beginning of the lifetime of the </a:t>
-            </a:r>
-            <a:r>
-              <a:rPr lang="en-US" sz="2400" dirty="0" smtClean="0"/>
-              <a:t>packet</a:t>
+              <a:t>Each packet type has a “fixed” packet size, decided at the beginning of the lifetime of the packet</a:t>
             </a:r>
           </a:p>
           <a:p>
@@ -15341,13 +15310,8 @@
           <a:p>
             <a:r>
               <a:rPr lang="en-US" sz="2400" dirty="0" smtClean="0"/>
-              <a:t>Packet type transitions </a:t>
-            </a:r>
-            <a:r>
-              <a:rPr lang="en-US" sz="2400" dirty="0" smtClean="0"/>
-              <a:t>may be deterministic</a:t>
-            </a:r>
-            <a:endParaRPr lang="en-US" sz="2400" dirty="0" smtClean="0"/>
+              <a:t>Packet type transitions may be deterministic</a:t>
+            </a:r>
           </a:p>
         </p:txBody>
       </p:sp>
@@ -17049,7 +17013,9 @@
         </p:nvSpPr>
         <p:spPr/>
         <p:txBody>
-          <a:bodyPr/>
+          <a:bodyPr>
+            <a:normAutofit lnSpcReduction="10000"/>
+          </a:bodyPr>
           <a:lstStyle/>
           <a:p>
             <a:r>
@@ -18346,8 +18312,9 @@
             </a:r>
             <a:r>
               <a:rPr lang="en-US" dirty="0" smtClean="0"/>
-              <a:t>parameters,</a:t>
-            </a:r>
+              <a:t>parameter:</a:t>
+            </a:r>
+            <a:endParaRPr lang="en-US" dirty="0" smtClean="0"/>
           </a:p>
           <a:p>
             <a:pPr lvl="1"/>
@@ -18428,21 +18395,21 @@
         <p:spPr/>
         <p:txBody>
           <a:bodyPr>
-            <a:normAutofit fontScale="90000"/>
+            <a:normAutofit/>
           </a:bodyPr>
           <a:lstStyle/>
           <a:p>
             <a:r>
               <a:rPr lang="en-US" dirty="0" smtClean="0"/>
-              <a:t>File Downloads: Varying </a:t>
-            </a:r>
-            <a:r>
-              <a:rPr lang="en-US" dirty="0" err="1" smtClean="0"/>
-              <a:t>Interarrival</a:t>
-            </a:r>
-            <a:r>
-              <a:rPr lang="en-US" dirty="0" smtClean="0"/>
-              <a:t> Time</a:t>
+              <a:t>File Downloads: </a:t>
+            </a:r>
+            <a:r>
+              <a:rPr lang="en-US" dirty="0" smtClean="0"/>
+              <a:t>Packet </a:t>
+            </a:r>
+            <a:r>
+              <a:rPr lang="en-US" dirty="0" smtClean="0"/>
+              <a:t>Size</a:t>
             </a:r>
             <a:endParaRPr lang="en-US" dirty="0"/>
           </a:p>
@@ -18450,7 +18417,7 @@
       </p:sp>
       <p:pic>
         <p:nvPicPr>
-          <p:cNvPr id="5" name="Picture 4" descr="fig-simulation_random_download-interarival-1_0_1_0_1_1_25.jpg"/>
+          <p:cNvPr id="4" name="Picture 3" descr="fig-simulation_random_download-maxpackets-1_0_1_0_1_1_25.jpg"/>
           <p:cNvPicPr>
             <a:picLocks noChangeAspect="1"/>
           </p:cNvPicPr>
@@ -18470,8 +18437,8 @@
         </p:blipFill>
         <p:spPr>
           <a:xfrm>
-            <a:off x="0" y="1919698"/>
-            <a:ext cx="4923676" cy="3692757"/>
+            <a:off x="-246137" y="1772044"/>
+            <a:ext cx="5027293" cy="3770470"/>
           </a:xfrm>
           <a:prstGeom prst="rect">
             <a:avLst/>
@@ -18480,7 +18447,7 @@
       </p:pic>
       <p:pic>
         <p:nvPicPr>
-          <p:cNvPr id="4" name="Picture 3" descr="fig-simulation_random_download-interarival-1_0_5_0_1_1_25.jpg"/>
+          <p:cNvPr id="5" name="Picture 4" descr="fig-simulation_random_download-maxpackets-1_0_5_0_1_1_25.jpg"/>
           <p:cNvPicPr>
             <a:picLocks noChangeAspect="1"/>
           </p:cNvPicPr>
@@ -18500,8 +18467,8 @@
         </p:blipFill>
         <p:spPr>
           <a:xfrm>
-            <a:off x="4558462" y="1919697"/>
-            <a:ext cx="4923675" cy="3692757"/>
+            <a:off x="4302681" y="1772044"/>
+            <a:ext cx="5323749" cy="3841335"/>
           </a:xfrm>
           <a:prstGeom prst="rect">
             <a:avLst/>
@@ -18571,7 +18538,7 @@
     </p:spTree>
     <p:extLst>
       <p:ext uri="{BB962C8B-B14F-4D97-AF65-F5344CB8AC3E}">
-        <p14:creationId xmlns:p14="http://schemas.microsoft.com/office/powerpoint/2010/main" val="451484042"/>
+        <p14:creationId xmlns:p14="http://schemas.microsoft.com/office/powerpoint/2010/main" val="3186649161"/>
       </p:ext>
     </p:extLst>
   </p:cSld>
@@ -18610,135 +18577,88 @@
         </p:nvSpPr>
         <p:spPr/>
         <p:txBody>
+          <a:bodyPr/>
+          <a:lstStyle/>
+          <a:p>
+            <a:r>
+              <a:rPr lang="en-US" dirty="0" smtClean="0"/>
+              <a:t>Observations</a:t>
+            </a:r>
+            <a:endParaRPr lang="en-US" dirty="0"/>
+          </a:p>
+        </p:txBody>
+      </p:sp>
+      <p:sp>
+        <p:nvSpPr>
+          <p:cNvPr id="3" name="Content Placeholder 2"/>
+          <p:cNvSpPr>
+            <a:spLocks noGrp="1"/>
+          </p:cNvSpPr>
+          <p:nvPr>
+            <p:ph idx="1"/>
+          </p:nvPr>
+        </p:nvSpPr>
+        <p:spPr/>
+        <p:txBody>
           <a:bodyPr>
             <a:normAutofit/>
           </a:bodyPr>
           <a:lstStyle/>
           <a:p>
             <a:r>
-              <a:rPr lang="en-US" dirty="0" smtClean="0"/>
-              <a:t>File Downloads: Varying Packet Size</a:t>
-            </a:r>
-            <a:endParaRPr lang="en-US" dirty="0"/>
-          </a:p>
-        </p:txBody>
-      </p:sp>
-      <p:pic>
-        <p:nvPicPr>
-          <p:cNvPr id="4" name="Picture 3" descr="fig-simulation_random_download-maxpackets-1_0_1_0_1_1_25.jpg"/>
-          <p:cNvPicPr>
-            <a:picLocks noChangeAspect="1"/>
-          </p:cNvPicPr>
-          <p:nvPr/>
-        </p:nvPicPr>
-        <p:blipFill>
-          <a:blip r:embed="rId2">
-            <a:extLst>
-              <a:ext uri="{28A0092B-C50C-407E-A947-70E740481C1C}">
-                <a14:useLocalDpi xmlns:a14="http://schemas.microsoft.com/office/drawing/2010/main" val="0"/>
-              </a:ext>
-            </a:extLst>
-          </a:blip>
-          <a:stretch>
-            <a:fillRect/>
-          </a:stretch>
-        </p:blipFill>
-        <p:spPr>
-          <a:xfrm>
-            <a:off x="-246137" y="1772044"/>
-            <a:ext cx="5027293" cy="3770470"/>
-          </a:xfrm>
-          <a:prstGeom prst="rect">
-            <a:avLst/>
-          </a:prstGeom>
-        </p:spPr>
-      </p:pic>
-      <p:pic>
-        <p:nvPicPr>
-          <p:cNvPr id="5" name="Picture 4" descr="fig-simulation_random_download-maxpackets-1_0_5_0_1_1_25.jpg"/>
-          <p:cNvPicPr>
-            <a:picLocks noChangeAspect="1"/>
-          </p:cNvPicPr>
-          <p:nvPr/>
-        </p:nvPicPr>
-        <p:blipFill>
-          <a:blip r:embed="rId3">
-            <a:extLst>
-              <a:ext uri="{28A0092B-C50C-407E-A947-70E740481C1C}">
-                <a14:useLocalDpi xmlns:a14="http://schemas.microsoft.com/office/drawing/2010/main" val="0"/>
-              </a:ext>
-            </a:extLst>
-          </a:blip>
-          <a:stretch>
-            <a:fillRect/>
-          </a:stretch>
-        </p:blipFill>
-        <p:spPr>
-          <a:xfrm>
-            <a:off x="4302681" y="1772044"/>
-            <a:ext cx="5323749" cy="3841335"/>
-          </a:xfrm>
-          <a:prstGeom prst="rect">
-            <a:avLst/>
-          </a:prstGeom>
-        </p:spPr>
-      </p:pic>
-      <p:sp>
-        <p:nvSpPr>
-          <p:cNvPr id="6" name="TextBox 5"/>
-          <p:cNvSpPr txBox="1"/>
-          <p:nvPr/>
-        </p:nvSpPr>
-        <p:spPr>
-          <a:xfrm>
-            <a:off x="1466978" y="5675257"/>
-            <a:ext cx="2185699" cy="369332"/>
-          </a:xfrm>
-          <a:prstGeom prst="rect">
-            <a:avLst/>
-          </a:prstGeom>
-          <a:noFill/>
-        </p:spPr>
-        <p:txBody>
-          <a:bodyPr wrap="square" rtlCol="0">
-            <a:spAutoFit/>
-          </a:bodyPr>
-          <a:lstStyle/>
-          <a:p>
-            <a:r>
-              <a:rPr lang="en-US" dirty="0" smtClean="0"/>
-              <a:t>Packet Size = [1]</a:t>
-            </a:r>
-            <a:endParaRPr lang="en-US" dirty="0"/>
-          </a:p>
-        </p:txBody>
-      </p:sp>
-      <p:sp>
-        <p:nvSpPr>
-          <p:cNvPr id="7" name="TextBox 6"/>
-          <p:cNvSpPr txBox="1"/>
-          <p:nvPr/>
-        </p:nvSpPr>
-        <p:spPr>
-          <a:xfrm>
-            <a:off x="5769458" y="5646752"/>
-            <a:ext cx="2731919" cy="369332"/>
-          </a:xfrm>
-          <a:prstGeom prst="rect">
-            <a:avLst/>
-          </a:prstGeom>
-          <a:noFill/>
-        </p:spPr>
-        <p:txBody>
-          <a:bodyPr wrap="square" rtlCol="0">
-            <a:spAutoFit/>
-          </a:bodyPr>
-          <a:lstStyle/>
-          <a:p>
-            <a:r>
-              <a:rPr lang="en-US" dirty="0" smtClean="0"/>
-              <a:t>Packet Size = [1,2,3,4,5]</a:t>
-            </a:r>
+              <a:rPr lang="en-US" b="1" dirty="0" smtClean="0"/>
+              <a:t>Average </a:t>
+            </a:r>
+            <a:r>
+              <a:rPr lang="en-US" b="1" dirty="0" smtClean="0"/>
+              <a:t>throughput</a:t>
+            </a:r>
+            <a:r>
+              <a:rPr lang="en-US" dirty="0" smtClean="0"/>
+              <a:t> increases as the size of packets increases</a:t>
+            </a:r>
+          </a:p>
+          <a:p>
+            <a:r>
+              <a:rPr lang="en-US" b="1" dirty="0" smtClean="0"/>
+              <a:t>Download throughput</a:t>
+            </a:r>
+            <a:r>
+              <a:rPr lang="en-US" dirty="0" smtClean="0"/>
+              <a:t> is </a:t>
+            </a:r>
+            <a:r>
+              <a:rPr lang="en-US" dirty="0" smtClean="0"/>
+              <a:t>nearly </a:t>
+            </a:r>
+            <a:r>
+              <a:rPr lang="en-US" dirty="0" smtClean="0"/>
+              <a:t>starved </a:t>
+            </a:r>
+            <a:r>
+              <a:rPr lang="en-US" dirty="0" smtClean="0"/>
+              <a:t>due to increasing packet sizes and long </a:t>
+            </a:r>
+            <a:r>
+              <a:rPr lang="en-US" dirty="0" err="1" smtClean="0"/>
+              <a:t>interarrival</a:t>
+            </a:r>
+            <a:r>
+              <a:rPr lang="en-US" dirty="0" smtClean="0"/>
+              <a:t> time (longer time between attempts)</a:t>
+            </a:r>
+          </a:p>
+          <a:p>
+            <a:r>
+              <a:rPr lang="en-US" dirty="0" smtClean="0"/>
+              <a:t>Longer packet transmission times increase likelihood of error</a:t>
+            </a:r>
+            <a:endParaRPr lang="en-US" dirty="0" smtClean="0"/>
+          </a:p>
+          <a:p>
+            <a:pPr marL="0" indent="0">
+              <a:buNone/>
+            </a:pPr>
             <a:endParaRPr lang="en-US" dirty="0"/>
           </a:p>
         </p:txBody>
@@ -18746,7 +18666,7 @@
     </p:spTree>
     <p:extLst>
       <p:ext uri="{BB962C8B-B14F-4D97-AF65-F5344CB8AC3E}">
-        <p14:creationId xmlns:p14="http://schemas.microsoft.com/office/powerpoint/2010/main" val="3186649161"/>
+        <p14:creationId xmlns:p14="http://schemas.microsoft.com/office/powerpoint/2010/main" val="68225269"/>
       </p:ext>
     </p:extLst>
   </p:cSld>
@@ -18785,81 +18705,135 @@
         </p:nvSpPr>
         <p:spPr/>
         <p:txBody>
-          <a:bodyPr/>
-          <a:lstStyle/>
-          <a:p>
-            <a:r>
-              <a:rPr lang="en-US" dirty="0" smtClean="0"/>
-              <a:t>Observations</a:t>
+          <a:bodyPr>
+            <a:normAutofit fontScale="90000"/>
+          </a:bodyPr>
+          <a:lstStyle/>
+          <a:p>
+            <a:r>
+              <a:rPr lang="en-US" dirty="0" smtClean="0"/>
+              <a:t>Web Browsing: Probability Traffic Gaps</a:t>
             </a:r>
             <a:endParaRPr lang="en-US" dirty="0"/>
           </a:p>
         </p:txBody>
       </p:sp>
-      <p:sp>
-        <p:nvSpPr>
-          <p:cNvPr id="3" name="Content Placeholder 2"/>
-          <p:cNvSpPr>
-            <a:spLocks noGrp="1"/>
-          </p:cNvSpPr>
-          <p:nvPr>
-            <p:ph idx="1"/>
-          </p:nvPr>
-        </p:nvSpPr>
-        <p:spPr/>
-        <p:txBody>
-          <a:bodyPr>
-            <a:normAutofit fontScale="92500" lnSpcReduction="10000"/>
+      <p:pic>
+        <p:nvPicPr>
+          <p:cNvPr id="9" name="Picture 8" descr="enter.jpg"/>
+          <p:cNvPicPr>
+            <a:picLocks noChangeAspect="1"/>
+          </p:cNvPicPr>
+          <p:nvPr/>
+        </p:nvPicPr>
+        <p:blipFill>
+          <a:blip r:embed="rId2">
+            <a:extLst>
+              <a:ext uri="{28A0092B-C50C-407E-A947-70E740481C1C}">
+                <a14:useLocalDpi xmlns:a14="http://schemas.microsoft.com/office/drawing/2010/main" val="0"/>
+              </a:ext>
+            </a:extLst>
+          </a:blip>
+          <a:stretch>
+            <a:fillRect/>
+          </a:stretch>
+        </p:blipFill>
+        <p:spPr>
+          <a:xfrm>
+            <a:off x="4382074" y="1932352"/>
+            <a:ext cx="5244360" cy="3933270"/>
+          </a:xfrm>
+          <a:prstGeom prst="rect">
+            <a:avLst/>
+          </a:prstGeom>
+        </p:spPr>
+      </p:pic>
+      <p:pic>
+        <p:nvPicPr>
+          <p:cNvPr id="10" name="Picture 9" descr="enter1.jpg"/>
+          <p:cNvPicPr>
+            <a:picLocks noChangeAspect="1"/>
+          </p:cNvPicPr>
+          <p:nvPr/>
+        </p:nvPicPr>
+        <p:blipFill>
+          <a:blip r:embed="rId3">
+            <a:extLst>
+              <a:ext uri="{28A0092B-C50C-407E-A947-70E740481C1C}">
+                <a14:useLocalDpi xmlns:a14="http://schemas.microsoft.com/office/drawing/2010/main" val="0"/>
+              </a:ext>
+            </a:extLst>
+          </a:blip>
+          <a:stretch>
+            <a:fillRect/>
+          </a:stretch>
+        </p:blipFill>
+        <p:spPr>
+          <a:xfrm>
+            <a:off x="-255980" y="1932352"/>
+            <a:ext cx="4981819" cy="3736364"/>
+          </a:xfrm>
+          <a:prstGeom prst="rect">
+            <a:avLst/>
+          </a:prstGeom>
+        </p:spPr>
+      </p:pic>
+      <p:sp>
+        <p:nvSpPr>
+          <p:cNvPr id="11" name="TextBox 10"/>
+          <p:cNvSpPr txBox="1"/>
+          <p:nvPr/>
+        </p:nvSpPr>
+        <p:spPr>
+          <a:xfrm>
+            <a:off x="1466978" y="5675257"/>
+            <a:ext cx="2185699" cy="369332"/>
+          </a:xfrm>
+          <a:prstGeom prst="rect">
+            <a:avLst/>
+          </a:prstGeom>
+          <a:noFill/>
+        </p:spPr>
+        <p:txBody>
+          <a:bodyPr wrap="square" rtlCol="0">
+            <a:spAutoFit/>
           </a:bodyPr>
           <a:lstStyle/>
           <a:p>
             <a:r>
-              <a:rPr lang="en-US" b="1" dirty="0" smtClean="0"/>
-              <a:t>Average throughput</a:t>
-            </a:r>
-            <a:r>
-              <a:rPr lang="en-US" dirty="0" smtClean="0"/>
-              <a:t> increases as the time between file download bursts of packets increases</a:t>
-            </a:r>
-          </a:p>
-          <a:p>
-            <a:r>
-              <a:rPr lang="en-US" b="1" dirty="0" smtClean="0"/>
-              <a:t>Average throughput</a:t>
-            </a:r>
-            <a:r>
-              <a:rPr lang="en-US" dirty="0" smtClean="0"/>
-              <a:t> increases as the size of packets increases</a:t>
-            </a:r>
-          </a:p>
-          <a:p>
-            <a:r>
-              <a:rPr lang="en-US" b="1" dirty="0" smtClean="0"/>
-              <a:t>Download throughput</a:t>
-            </a:r>
-            <a:r>
-              <a:rPr lang="en-US" dirty="0" smtClean="0"/>
-              <a:t> is starved due to increasing packet sizes and long </a:t>
-            </a:r>
-            <a:r>
-              <a:rPr lang="en-US" dirty="0" err="1" smtClean="0"/>
-              <a:t>interarrival</a:t>
-            </a:r>
-            <a:r>
-              <a:rPr lang="en-US" dirty="0" smtClean="0"/>
-              <a:t> time (longer time between attempts)</a:t>
-            </a:r>
-          </a:p>
-          <a:p>
-            <a:r>
-              <a:rPr lang="en-US" dirty="0" smtClean="0"/>
-              <a:t>Long times between bursts leave more room for other nodes to transmit </a:t>
-            </a:r>
-          </a:p>
-          <a:p>
-            <a:pPr marL="0" indent="0">
-              <a:buNone/>
-            </a:pPr>
+              <a:rPr lang="en-US" dirty="0" smtClean="0"/>
+              <a:t>Packet Size = [1]</a:t>
+            </a:r>
+            <a:endParaRPr lang="en-US" dirty="0"/>
+          </a:p>
+        </p:txBody>
+      </p:sp>
+      <p:sp>
+        <p:nvSpPr>
+          <p:cNvPr id="12" name="TextBox 11"/>
+          <p:cNvSpPr txBox="1"/>
+          <p:nvPr/>
+        </p:nvSpPr>
+        <p:spPr>
+          <a:xfrm>
+            <a:off x="5769458" y="5646752"/>
+            <a:ext cx="2731919" cy="369332"/>
+          </a:xfrm>
+          <a:prstGeom prst="rect">
+            <a:avLst/>
+          </a:prstGeom>
+          <a:noFill/>
+        </p:spPr>
+        <p:txBody>
+          <a:bodyPr wrap="square" rtlCol="0">
+            <a:spAutoFit/>
+          </a:bodyPr>
+          <a:lstStyle/>
+          <a:p>
+            <a:r>
+              <a:rPr lang="en-US" dirty="0" smtClean="0"/>
+              <a:t>Packet Size = [1,2,3,4,5]</a:t>
+            </a:r>
             <a:endParaRPr lang="en-US" dirty="0"/>
           </a:p>
         </p:txBody>
@@ -18867,7 +18841,7 @@
     </p:spTree>
     <p:extLst>
       <p:ext uri="{BB962C8B-B14F-4D97-AF65-F5344CB8AC3E}">
-        <p14:creationId xmlns:p14="http://schemas.microsoft.com/office/powerpoint/2010/main" val="68225269"/>
+        <p14:creationId xmlns:p14="http://schemas.microsoft.com/office/powerpoint/2010/main" val="3605966855"/>
       </p:ext>
     </p:extLst>
   </p:cSld>
@@ -18906,135 +18880,58 @@
         </p:nvSpPr>
         <p:spPr/>
         <p:txBody>
-          <a:bodyPr>
-            <a:normAutofit fontScale="90000"/>
-          </a:bodyPr>
-          <a:lstStyle/>
-          <a:p>
-            <a:r>
-              <a:rPr lang="en-US" dirty="0" smtClean="0"/>
-              <a:t>Web Browsing: Probability Traffic Gaps</a:t>
+          <a:bodyPr/>
+          <a:lstStyle/>
+          <a:p>
+            <a:r>
+              <a:rPr lang="en-US" dirty="0" smtClean="0"/>
+              <a:t>Observations</a:t>
             </a:r>
             <a:endParaRPr lang="en-US" dirty="0"/>
           </a:p>
         </p:txBody>
       </p:sp>
-      <p:pic>
-        <p:nvPicPr>
-          <p:cNvPr id="9" name="Picture 8" descr="enter.jpg"/>
-          <p:cNvPicPr>
-            <a:picLocks noChangeAspect="1"/>
-          </p:cNvPicPr>
-          <p:nvPr/>
-        </p:nvPicPr>
-        <p:blipFill>
-          <a:blip r:embed="rId2">
-            <a:extLst>
-              <a:ext uri="{28A0092B-C50C-407E-A947-70E740481C1C}">
-                <a14:useLocalDpi xmlns:a14="http://schemas.microsoft.com/office/drawing/2010/main" val="0"/>
-              </a:ext>
-            </a:extLst>
-          </a:blip>
-          <a:stretch>
-            <a:fillRect/>
-          </a:stretch>
-        </p:blipFill>
-        <p:spPr>
-          <a:xfrm>
-            <a:off x="4382074" y="1932352"/>
-            <a:ext cx="5244360" cy="3933270"/>
-          </a:xfrm>
-          <a:prstGeom prst="rect">
-            <a:avLst/>
-          </a:prstGeom>
-        </p:spPr>
-      </p:pic>
-      <p:pic>
-        <p:nvPicPr>
-          <p:cNvPr id="10" name="Picture 9" descr="enter1.jpg"/>
-          <p:cNvPicPr>
-            <a:picLocks noChangeAspect="1"/>
-          </p:cNvPicPr>
-          <p:nvPr/>
-        </p:nvPicPr>
-        <p:blipFill>
-          <a:blip r:embed="rId3">
-            <a:extLst>
-              <a:ext uri="{28A0092B-C50C-407E-A947-70E740481C1C}">
-                <a14:useLocalDpi xmlns:a14="http://schemas.microsoft.com/office/drawing/2010/main" val="0"/>
-              </a:ext>
-            </a:extLst>
-          </a:blip>
-          <a:stretch>
-            <a:fillRect/>
-          </a:stretch>
-        </p:blipFill>
-        <p:spPr>
-          <a:xfrm>
-            <a:off x="-255980" y="1932352"/>
-            <a:ext cx="4981819" cy="3736364"/>
-          </a:xfrm>
-          <a:prstGeom prst="rect">
-            <a:avLst/>
-          </a:prstGeom>
-        </p:spPr>
-      </p:pic>
-      <p:sp>
-        <p:nvSpPr>
-          <p:cNvPr id="11" name="TextBox 10"/>
-          <p:cNvSpPr txBox="1"/>
-          <p:nvPr/>
-        </p:nvSpPr>
-        <p:spPr>
-          <a:xfrm>
-            <a:off x="1466978" y="5675257"/>
-            <a:ext cx="2185699" cy="369332"/>
-          </a:xfrm>
-          <a:prstGeom prst="rect">
-            <a:avLst/>
-          </a:prstGeom>
-          <a:noFill/>
-        </p:spPr>
-        <p:txBody>
-          <a:bodyPr wrap="square" rtlCol="0">
-            <a:spAutoFit/>
-          </a:bodyPr>
-          <a:lstStyle/>
-          <a:p>
-            <a:r>
-              <a:rPr lang="en-US" dirty="0" smtClean="0"/>
-              <a:t>Packet Size = [1]</a:t>
+      <p:sp>
+        <p:nvSpPr>
+          <p:cNvPr id="3" name="Content Placeholder 2"/>
+          <p:cNvSpPr>
+            <a:spLocks noGrp="1"/>
+          </p:cNvSpPr>
+          <p:nvPr>
+            <p:ph idx="1"/>
+          </p:nvPr>
+        </p:nvSpPr>
+        <p:spPr/>
+        <p:txBody>
+          <a:bodyPr/>
+          <a:lstStyle/>
+          <a:p>
+            <a:r>
+              <a:rPr lang="en-US" dirty="0" smtClean="0"/>
+              <a:t>For small gaps, random node throughput unaffected</a:t>
+            </a:r>
+          </a:p>
+          <a:p>
+            <a:r>
+              <a:rPr lang="en-US" dirty="0" smtClean="0"/>
+              <a:t>For large gaps, random node throughput increases with respect</a:t>
+            </a:r>
+          </a:p>
+          <a:p>
+            <a:r>
+              <a:rPr lang="en-US" b="1" dirty="0" smtClean="0"/>
+              <a:t>Overall:</a:t>
+            </a:r>
+            <a:r>
+              <a:rPr lang="en-US" dirty="0" smtClean="0"/>
+              <a:t> Sporadic nature of web traffic characteristics favors other nodes in the system</a:t>
             </a:r>
             <a:endParaRPr lang="en-US" dirty="0"/>
           </a:p>
-        </p:txBody>
-      </p:sp>
-      <p:sp>
-        <p:nvSpPr>
-          <p:cNvPr id="12" name="TextBox 11"/>
-          <p:cNvSpPr txBox="1"/>
-          <p:nvPr/>
-        </p:nvSpPr>
-        <p:spPr>
-          <a:xfrm>
-            <a:off x="5769458" y="5646752"/>
-            <a:ext cx="2731919" cy="369332"/>
-          </a:xfrm>
-          <a:prstGeom prst="rect">
-            <a:avLst/>
-          </a:prstGeom>
-          <a:noFill/>
-        </p:spPr>
-        <p:txBody>
-          <a:bodyPr wrap="square" rtlCol="0">
-            <a:spAutoFit/>
-          </a:bodyPr>
-          <a:lstStyle/>
-          <a:p>
-            <a:r>
-              <a:rPr lang="en-US" dirty="0" smtClean="0"/>
-              <a:t>Packet Size = [1,2,3,4,5]</a:t>
-            </a:r>
+          <a:p>
+            <a:endParaRPr lang="en-US" b="1" dirty="0" smtClean="0"/>
+          </a:p>
+          <a:p>
             <a:endParaRPr lang="en-US" dirty="0"/>
           </a:p>
         </p:txBody>
@@ -19042,7 +18939,7 @@
     </p:spTree>
     <p:extLst>
       <p:ext uri="{BB962C8B-B14F-4D97-AF65-F5344CB8AC3E}">
-        <p14:creationId xmlns:p14="http://schemas.microsoft.com/office/powerpoint/2010/main" val="3605966855"/>
+        <p14:creationId xmlns:p14="http://schemas.microsoft.com/office/powerpoint/2010/main" val="3202165143"/>
       </p:ext>
     </p:extLst>
   </p:cSld>
@@ -19086,53 +18983,136 @@
           <a:p>
             <a:r>
               <a:rPr lang="en-US" dirty="0" smtClean="0"/>
-              <a:t>Observations</a:t>
+              <a:t>Multimedia: </a:t>
+            </a:r>
+            <a:r>
+              <a:rPr lang="en-US" dirty="0" smtClean="0"/>
+              <a:t>Streaming </a:t>
+            </a:r>
+            <a:r>
+              <a:rPr lang="en-US" dirty="0" smtClean="0"/>
+              <a:t>BPS</a:t>
             </a:r>
             <a:endParaRPr lang="en-US" dirty="0"/>
           </a:p>
         </p:txBody>
       </p:sp>
-      <p:sp>
-        <p:nvSpPr>
-          <p:cNvPr id="3" name="Content Placeholder 2"/>
-          <p:cNvSpPr>
-            <a:spLocks noGrp="1"/>
-          </p:cNvSpPr>
-          <p:nvPr>
-            <p:ph idx="1"/>
-          </p:nvPr>
-        </p:nvSpPr>
-        <p:spPr/>
-        <p:txBody>
-          <a:bodyPr/>
-          <a:lstStyle/>
-          <a:p>
-            <a:r>
-              <a:rPr lang="en-US" dirty="0" smtClean="0"/>
-              <a:t>For small gaps, random node throughput unaffected</a:t>
-            </a:r>
-          </a:p>
-          <a:p>
-            <a:r>
-              <a:rPr lang="en-US" dirty="0" smtClean="0"/>
-              <a:t>For large gaps, random node throughput increases with respect</a:t>
-            </a:r>
-          </a:p>
-          <a:p>
-            <a:r>
-              <a:rPr lang="en-US" b="1" dirty="0" smtClean="0"/>
-              <a:t>Overall:</a:t>
-            </a:r>
-            <a:r>
-              <a:rPr lang="en-US" dirty="0" smtClean="0"/>
-              <a:t> Sporadic nature of web traffic characteristics favors other nodes in the system</a:t>
+      <p:pic>
+        <p:nvPicPr>
+          <p:cNvPr id="4" name="Picture 3" descr="fig-simulation_random_multimedia-bps-1_0_5_0_12000.jpg"/>
+          <p:cNvPicPr>
+            <a:picLocks noChangeAspect="1"/>
+          </p:cNvPicPr>
+          <p:nvPr/>
+        </p:nvPicPr>
+        <p:blipFill>
+          <a:blip r:embed="rId2">
+            <a:extLst>
+              <a:ext uri="{28A0092B-C50C-407E-A947-70E740481C1C}">
+                <a14:useLocalDpi xmlns:a14="http://schemas.microsoft.com/office/drawing/2010/main" val="0"/>
+              </a:ext>
+            </a:extLst>
+          </a:blip>
+          <a:stretch>
+            <a:fillRect/>
+          </a:stretch>
+        </p:blipFill>
+        <p:spPr>
+          <a:xfrm>
+            <a:off x="4558461" y="1610879"/>
+            <a:ext cx="4975513" cy="3923859"/>
+          </a:xfrm>
+          <a:prstGeom prst="rect">
+            <a:avLst/>
+          </a:prstGeom>
+        </p:spPr>
+      </p:pic>
+      <p:pic>
+        <p:nvPicPr>
+          <p:cNvPr id="5" name="Picture 4" descr="fig-simulation_random_multimedia-bps-1_0_1_0_12000.jpg"/>
+          <p:cNvPicPr>
+            <a:picLocks noChangeAspect="1"/>
+          </p:cNvPicPr>
+          <p:nvPr/>
+        </p:nvPicPr>
+        <p:blipFill>
+          <a:blip r:embed="rId3">
+            <a:extLst>
+              <a:ext uri="{28A0092B-C50C-407E-A947-70E740481C1C}">
+                <a14:useLocalDpi xmlns:a14="http://schemas.microsoft.com/office/drawing/2010/main" val="0"/>
+              </a:ext>
+            </a:extLst>
+          </a:blip>
+          <a:stretch>
+            <a:fillRect/>
+          </a:stretch>
+        </p:blipFill>
+        <p:spPr>
+          <a:xfrm>
+            <a:off x="-277993" y="1610879"/>
+            <a:ext cx="5182476" cy="3886857"/>
+          </a:xfrm>
+          <a:prstGeom prst="rect">
+            <a:avLst/>
+          </a:prstGeom>
+        </p:spPr>
+      </p:pic>
+      <p:sp>
+        <p:nvSpPr>
+          <p:cNvPr id="6" name="TextBox 5"/>
+          <p:cNvSpPr txBox="1"/>
+          <p:nvPr/>
+        </p:nvSpPr>
+        <p:spPr>
+          <a:xfrm>
+            <a:off x="1466978" y="5675257"/>
+            <a:ext cx="2185699" cy="369332"/>
+          </a:xfrm>
+          <a:prstGeom prst="rect">
+            <a:avLst/>
+          </a:prstGeom>
+          <a:noFill/>
+        </p:spPr>
+        <p:txBody>
+          <a:bodyPr wrap="square" rtlCol="0">
+            <a:spAutoFit/>
+          </a:bodyPr>
+          <a:lstStyle/>
+          <a:p>
+            <a:r>
+              <a:rPr lang="en-US" dirty="0" smtClean="0"/>
+              <a:t>Packet Size = [1]</a:t>
             </a:r>
             <a:endParaRPr lang="en-US" dirty="0"/>
           </a:p>
-          <a:p>
-            <a:endParaRPr lang="en-US" b="1" dirty="0" smtClean="0"/>
-          </a:p>
-          <a:p>
+        </p:txBody>
+      </p:sp>
+      <p:sp>
+        <p:nvSpPr>
+          <p:cNvPr id="7" name="TextBox 6"/>
+          <p:cNvSpPr txBox="1"/>
+          <p:nvPr/>
+        </p:nvSpPr>
+        <p:spPr>
+          <a:xfrm>
+            <a:off x="5769458" y="5646752"/>
+            <a:ext cx="2731919" cy="369332"/>
+          </a:xfrm>
+          <a:prstGeom prst="rect">
+            <a:avLst/>
+          </a:prstGeom>
+          <a:noFill/>
+        </p:spPr>
+        <p:txBody>
+          <a:bodyPr wrap="square" rtlCol="0">
+            <a:spAutoFit/>
+          </a:bodyPr>
+          <a:lstStyle/>
+          <a:p>
+            <a:r>
+              <a:rPr lang="en-US" dirty="0" smtClean="0"/>
+              <a:t>Packet Size = [1,2,3,4,5]</a:t>
+            </a:r>
             <a:endParaRPr lang="en-US" dirty="0"/>
           </a:p>
         </p:txBody>
@@ -19140,7 +19120,7 @@
     </p:spTree>
     <p:extLst>
       <p:ext uri="{BB962C8B-B14F-4D97-AF65-F5344CB8AC3E}">
-        <p14:creationId xmlns:p14="http://schemas.microsoft.com/office/powerpoint/2010/main" val="3202165143"/>
+        <p14:creationId xmlns:p14="http://schemas.microsoft.com/office/powerpoint/2010/main" val="1110711269"/>
       </p:ext>
     </p:extLst>
   </p:cSld>
@@ -19184,136 +19164,63 @@
           <a:p>
             <a:r>
               <a:rPr lang="en-US" dirty="0" smtClean="0"/>
-              <a:t>Multimedia: Varying Streaming BPS</a:t>
+              <a:t>Observations</a:t>
             </a:r>
             <a:endParaRPr lang="en-US" dirty="0"/>
           </a:p>
         </p:txBody>
       </p:sp>
-      <p:pic>
-        <p:nvPicPr>
-          <p:cNvPr id="4" name="Picture 3" descr="fig-simulation_random_multimedia-bps-1_0_5_0_12000.jpg"/>
-          <p:cNvPicPr>
-            <a:picLocks noChangeAspect="1"/>
-          </p:cNvPicPr>
-          <p:nvPr/>
-        </p:nvPicPr>
-        <p:blipFill>
-          <a:blip r:embed="rId2">
-            <a:extLst>
-              <a:ext uri="{28A0092B-C50C-407E-A947-70E740481C1C}">
-                <a14:useLocalDpi xmlns:a14="http://schemas.microsoft.com/office/drawing/2010/main" val="0"/>
-              </a:ext>
-            </a:extLst>
-          </a:blip>
-          <a:stretch>
-            <a:fillRect/>
-          </a:stretch>
-        </p:blipFill>
-        <p:spPr>
-          <a:xfrm>
-            <a:off x="4558461" y="1610879"/>
-            <a:ext cx="4975513" cy="3923859"/>
-          </a:xfrm>
-          <a:prstGeom prst="rect">
-            <a:avLst/>
-          </a:prstGeom>
-        </p:spPr>
-      </p:pic>
-      <p:pic>
-        <p:nvPicPr>
-          <p:cNvPr id="5" name="Picture 4" descr="fig-simulation_random_multimedia-bps-1_0_1_0_12000.jpg"/>
-          <p:cNvPicPr>
-            <a:picLocks noChangeAspect="1"/>
-          </p:cNvPicPr>
-          <p:nvPr/>
-        </p:nvPicPr>
-        <p:blipFill>
-          <a:blip r:embed="rId3">
-            <a:extLst>
-              <a:ext uri="{28A0092B-C50C-407E-A947-70E740481C1C}">
-                <a14:useLocalDpi xmlns:a14="http://schemas.microsoft.com/office/drawing/2010/main" val="0"/>
-              </a:ext>
-            </a:extLst>
-          </a:blip>
-          <a:stretch>
-            <a:fillRect/>
-          </a:stretch>
-        </p:blipFill>
-        <p:spPr>
-          <a:xfrm>
-            <a:off x="-277993" y="1610879"/>
-            <a:ext cx="5182476" cy="3886857"/>
-          </a:xfrm>
-          <a:prstGeom prst="rect">
-            <a:avLst/>
-          </a:prstGeom>
-        </p:spPr>
-      </p:pic>
-      <p:sp>
-        <p:nvSpPr>
-          <p:cNvPr id="6" name="TextBox 5"/>
-          <p:cNvSpPr txBox="1"/>
-          <p:nvPr/>
-        </p:nvSpPr>
-        <p:spPr>
-          <a:xfrm>
-            <a:off x="1466978" y="5675257"/>
-            <a:ext cx="2185699" cy="369332"/>
-          </a:xfrm>
-          <a:prstGeom prst="rect">
-            <a:avLst/>
-          </a:prstGeom>
-          <a:noFill/>
-        </p:spPr>
-        <p:txBody>
-          <a:bodyPr wrap="square" rtlCol="0">
-            <a:spAutoFit/>
-          </a:bodyPr>
-          <a:lstStyle/>
-          <a:p>
-            <a:r>
-              <a:rPr lang="en-US" dirty="0" smtClean="0"/>
-              <a:t>Packet Size = [1]</a:t>
-            </a:r>
-            <a:endParaRPr lang="en-US" dirty="0"/>
-          </a:p>
-        </p:txBody>
-      </p:sp>
-      <p:sp>
-        <p:nvSpPr>
-          <p:cNvPr id="7" name="TextBox 6"/>
-          <p:cNvSpPr txBox="1"/>
-          <p:nvPr/>
-        </p:nvSpPr>
-        <p:spPr>
-          <a:xfrm>
-            <a:off x="5769458" y="5646752"/>
-            <a:ext cx="2731919" cy="369332"/>
-          </a:xfrm>
-          <a:prstGeom prst="rect">
-            <a:avLst/>
-          </a:prstGeom>
-          <a:noFill/>
-        </p:spPr>
-        <p:txBody>
-          <a:bodyPr wrap="square" rtlCol="0">
-            <a:spAutoFit/>
-          </a:bodyPr>
-          <a:lstStyle/>
-          <a:p>
-            <a:r>
-              <a:rPr lang="en-US" dirty="0" smtClean="0"/>
-              <a:t>Packet Size = [1,2,3,4,5]</a:t>
-            </a:r>
-            <a:endParaRPr lang="en-US" dirty="0"/>
+      <p:sp>
+        <p:nvSpPr>
+          <p:cNvPr id="3" name="Content Placeholder 2"/>
+          <p:cNvSpPr>
+            <a:spLocks noGrp="1"/>
+          </p:cNvSpPr>
+          <p:nvPr>
+            <p:ph idx="1"/>
+          </p:nvPr>
+        </p:nvSpPr>
+        <p:spPr/>
+        <p:txBody>
+          <a:bodyPr/>
+          <a:lstStyle/>
+          <a:p>
+            <a:r>
+              <a:rPr lang="en-US" dirty="0" smtClean="0"/>
+              <a:t>Higher streaming constraints starve other nodes in the network</a:t>
+            </a:r>
+          </a:p>
+          <a:p>
+            <a:pPr lvl="1"/>
+            <a:r>
+              <a:rPr lang="en-US" dirty="0" smtClean="0"/>
+              <a:t>Multimedia node throughput increases and random node throughput decreases as a function of streaming quality</a:t>
+            </a:r>
+          </a:p>
+          <a:p>
+            <a:r>
+              <a:rPr lang="en-US" dirty="0" smtClean="0"/>
+              <a:t>Small packet sizes for random nodes aren’t affected by multimedia streaming</a:t>
+            </a:r>
+          </a:p>
+          <a:p>
+            <a:pPr lvl="1"/>
+            <a:r>
+              <a:rPr lang="en-US" dirty="0" smtClean="0"/>
+              <a:t>Probable cause: streams of traffic are </a:t>
+            </a:r>
+            <a:r>
+              <a:rPr lang="en-US" i="1" dirty="0" smtClean="0"/>
+              <a:t>mixed together</a:t>
+            </a:r>
+            <a:endParaRPr lang="en-US" i="1" dirty="0"/>
           </a:p>
         </p:txBody>
       </p:sp>
     </p:spTree>
     <p:extLst>
       <p:ext uri="{BB962C8B-B14F-4D97-AF65-F5344CB8AC3E}">
-        <p14:creationId xmlns:p14="http://schemas.microsoft.com/office/powerpoint/2010/main" val="1110711269"/>
+        <p14:creationId xmlns:p14="http://schemas.microsoft.com/office/powerpoint/2010/main" val="3600294198"/>
       </p:ext>
     </p:extLst>
   </p:cSld>
@@ -19357,7 +19264,7 @@
           <a:p>
             <a:r>
               <a:rPr lang="en-US" dirty="0" smtClean="0"/>
-              <a:t>Observations</a:t>
+              <a:t>Conclusions</a:t>
             </a:r>
             <a:endParaRPr lang="en-US" dirty="0"/>
           </a:p>
@@ -19375,45 +19282,59 @@
         </p:nvSpPr>
         <p:spPr/>
         <p:txBody>
-          <a:bodyPr/>
-          <a:lstStyle/>
-          <a:p>
-            <a:r>
-              <a:rPr lang="en-US" dirty="0" smtClean="0"/>
-              <a:t>Higher streaming constraints starve other nodes in the network</a:t>
-            </a:r>
-          </a:p>
-          <a:p>
-            <a:pPr lvl="1"/>
-            <a:r>
-              <a:rPr lang="en-US" dirty="0" smtClean="0"/>
-              <a:t>Multimedia node throughput increases and random node throughput decreases as a function of streaming quality</a:t>
-            </a:r>
-          </a:p>
-          <a:p>
-            <a:r>
-              <a:rPr lang="en-US" dirty="0" smtClean="0"/>
-              <a:t>Small packet sizes for random nodes aren’t affected by multimedia streaming</a:t>
-            </a:r>
-          </a:p>
-          <a:p>
-            <a:pPr lvl="1"/>
-            <a:r>
-              <a:rPr lang="en-US" dirty="0" smtClean="0"/>
-              <a:t>Probable cause: streams of traffic are </a:t>
-            </a:r>
-            <a:r>
-              <a:rPr lang="en-US" i="1" dirty="0" smtClean="0"/>
-              <a:t>mixed together</a:t>
-            </a:r>
-            <a:endParaRPr lang="en-US" i="1" dirty="0"/>
+          <a:bodyPr>
+            <a:normAutofit fontScale="85000" lnSpcReduction="10000"/>
+          </a:bodyPr>
+          <a:lstStyle/>
+          <a:p>
+            <a:r>
+              <a:rPr lang="en-US" dirty="0" smtClean="0"/>
+              <a:t>The 802.11 DCF function behaves differently depending on the type of traffic being transmitted</a:t>
+            </a:r>
+          </a:p>
+          <a:p>
+            <a:r>
+              <a:rPr lang="en-US" dirty="0" smtClean="0"/>
+              <a:t>Throughput quickly degrades as more than one node is using the channel (higher collision probability)</a:t>
+            </a:r>
+          </a:p>
+          <a:p>
+            <a:r>
+              <a:rPr lang="en-US" dirty="0" smtClean="0"/>
+              <a:t>Application-agnostic random </a:t>
+            </a:r>
+            <a:r>
+              <a:rPr lang="en-US" dirty="0" err="1" smtClean="0"/>
+              <a:t>backoffs</a:t>
+            </a:r>
+            <a:r>
+              <a:rPr lang="en-US" dirty="0" smtClean="0"/>
+              <a:t> are perhaps not the best choice for collision avoidance when dealing with non-multimedia streams</a:t>
+            </a:r>
+          </a:p>
+          <a:p>
+            <a:r>
+              <a:rPr lang="en-US" dirty="0" smtClean="0"/>
+              <a:t>Random </a:t>
+            </a:r>
+            <a:r>
+              <a:rPr lang="en-US" dirty="0" err="1" smtClean="0"/>
+              <a:t>backoffs</a:t>
+            </a:r>
+            <a:r>
+              <a:rPr lang="en-US" dirty="0" smtClean="0"/>
+              <a:t> serve multimedia traffic quite well in the presence of other nodes</a:t>
+            </a:r>
+          </a:p>
+          <a:p>
+            <a:endParaRPr lang="en-US" dirty="0"/>
           </a:p>
         </p:txBody>
       </p:sp>
     </p:spTree>
     <p:extLst>
       <p:ext uri="{BB962C8B-B14F-4D97-AF65-F5344CB8AC3E}">
-        <p14:creationId xmlns:p14="http://schemas.microsoft.com/office/powerpoint/2010/main" val="3600294198"/>
+        <p14:creationId xmlns:p14="http://schemas.microsoft.com/office/powerpoint/2010/main" val="1278045240"/>
       </p:ext>
     </p:extLst>
   </p:cSld>
@@ -19450,76 +19371,20 @@
             <p:ph type="title"/>
           </p:nvPr>
         </p:nvSpPr>
-        <p:spPr/>
+        <p:spPr>
+          <a:xfrm>
+            <a:off x="388281" y="2706255"/>
+            <a:ext cx="8229600" cy="1143000"/>
+          </a:xfrm>
+        </p:spPr>
         <p:txBody>
           <a:bodyPr/>
           <a:lstStyle/>
           <a:p>
             <a:r>
               <a:rPr lang="en-US" dirty="0" smtClean="0"/>
-              <a:t>Conclusions</a:t>
-            </a:r>
-            <a:endParaRPr lang="en-US" dirty="0"/>
-          </a:p>
-        </p:txBody>
-      </p:sp>
-      <p:sp>
-        <p:nvSpPr>
-          <p:cNvPr id="3" name="Content Placeholder 2"/>
-          <p:cNvSpPr>
-            <a:spLocks noGrp="1"/>
-          </p:cNvSpPr>
-          <p:nvPr>
-            <p:ph idx="1"/>
-          </p:nvPr>
-        </p:nvSpPr>
-        <p:spPr/>
-        <p:txBody>
-          <a:bodyPr>
-            <a:normAutofit fontScale="85000" lnSpcReduction="10000"/>
-          </a:bodyPr>
-          <a:lstStyle/>
-          <a:p>
-            <a:r>
-              <a:rPr lang="en-US" dirty="0" smtClean="0"/>
-              <a:t>The 802.11 DCF function behaves differently depending on the type of traffic being transmitted</a:t>
-            </a:r>
-          </a:p>
-          <a:p>
-            <a:r>
-              <a:rPr lang="en-US" dirty="0" smtClean="0"/>
-              <a:t>Throughput quickly degrades as more than one node is using the channel (higher collision probability)</a:t>
-            </a:r>
-          </a:p>
-          <a:p>
-            <a:r>
-              <a:rPr lang="en-US" dirty="0" smtClean="0"/>
-              <a:t>Application-agnostic random </a:t>
-            </a:r>
-            <a:r>
-              <a:rPr lang="en-US" dirty="0" err="1" smtClean="0"/>
-              <a:t>backoffs</a:t>
-            </a:r>
-            <a:r>
-              <a:rPr lang="en-US" dirty="0" smtClean="0"/>
-              <a:t> are perhaps not the best choice for collision avoidance when dealing with non-multimedia streams</a:t>
-            </a:r>
-          </a:p>
-          <a:p>
-            <a:r>
-              <a:rPr lang="en-US" dirty="0" smtClean="0"/>
-              <a:t>Random </a:t>
-            </a:r>
-            <a:r>
-              <a:rPr lang="en-US" dirty="0" err="1" smtClean="0"/>
-              <a:t>backoffs</a:t>
-            </a:r>
-            <a:r>
-              <a:rPr lang="en-US" dirty="0" smtClean="0"/>
-              <a:t> serve multimedia traffic quite well in the presence of other nodes</a:t>
-            </a:r>
-          </a:p>
-          <a:p>
+              <a:t>Questions?</a:t>
+            </a:r>
             <a:endParaRPr lang="en-US" dirty="0"/>
           </a:p>
         </p:txBody>
@@ -19527,7 +19392,7 @@
     </p:spTree>
     <p:extLst>
       <p:ext uri="{BB962C8B-B14F-4D97-AF65-F5344CB8AC3E}">
-        <p14:creationId xmlns:p14="http://schemas.microsoft.com/office/powerpoint/2010/main" val="1278045240"/>
+        <p14:creationId xmlns:p14="http://schemas.microsoft.com/office/powerpoint/2010/main" val="2962913224"/>
       </p:ext>
     </p:extLst>
   </p:cSld>
@@ -19853,64 +19718,6 @@
     <p:extLst>
       <p:ext uri="{BB962C8B-B14F-4D97-AF65-F5344CB8AC3E}">
         <p14:creationId xmlns:p14="http://schemas.microsoft.com/office/powerpoint/2010/main" val="1164583717"/>
-      </p:ext>
-    </p:extLst>
-  </p:cSld>
-  <p:clrMapOvr>
-    <a:masterClrMapping/>
-  </p:clrMapOvr>
-</p:sld>
-</file>
-
-<file path=ppt/slides/slide40.xml><?xml version="1.0" encoding="utf-8"?>
-<p:sld xmlns:a="http://schemas.openxmlformats.org/drawingml/2006/main" xmlns:r="http://schemas.openxmlformats.org/officeDocument/2006/relationships" xmlns:p="http://schemas.openxmlformats.org/presentationml/2006/main">
-  <p:cSld>
-    <p:spTree>
-      <p:nvGrpSpPr>
-        <p:cNvPr id="1" name=""/>
-        <p:cNvGrpSpPr/>
-        <p:nvPr/>
-      </p:nvGrpSpPr>
-      <p:grpSpPr>
-        <a:xfrm>
-          <a:off x="0" y="0"/>
-          <a:ext cx="0" cy="0"/>
-          <a:chOff x="0" y="0"/>
-          <a:chExt cx="0" cy="0"/>
-        </a:xfrm>
-      </p:grpSpPr>
-      <p:sp>
-        <p:nvSpPr>
-          <p:cNvPr id="2" name="Title 1"/>
-          <p:cNvSpPr>
-            <a:spLocks noGrp="1"/>
-          </p:cNvSpPr>
-          <p:nvPr>
-            <p:ph type="title"/>
-          </p:nvPr>
-        </p:nvSpPr>
-        <p:spPr>
-          <a:xfrm>
-            <a:off x="388281" y="2706255"/>
-            <a:ext cx="8229600" cy="1143000"/>
-          </a:xfrm>
-        </p:spPr>
-        <p:txBody>
-          <a:bodyPr/>
-          <a:lstStyle/>
-          <a:p>
-            <a:r>
-              <a:rPr lang="en-US" dirty="0" smtClean="0"/>
-              <a:t>Questions?</a:t>
-            </a:r>
-            <a:endParaRPr lang="en-US" dirty="0"/>
-          </a:p>
-        </p:txBody>
-      </p:sp>
-    </p:spTree>
-    <p:extLst>
-      <p:ext uri="{BB962C8B-B14F-4D97-AF65-F5344CB8AC3E}">
-        <p14:creationId xmlns:p14="http://schemas.microsoft.com/office/powerpoint/2010/main" val="2962913224"/>
       </p:ext>
     </p:extLst>
   </p:cSld>

</xml_diff>